<commit_message>
Analysis of Zachman & TOGAF
</commit_message>
<xml_diff>
--- a/interview/Architecture.pptx
+++ b/interview/Architecture.pptx
@@ -9,8 +9,9 @@
     <p:sldId id="257" r:id="rId3"/>
     <p:sldId id="260" r:id="rId4"/>
     <p:sldId id="261" r:id="rId5"/>
-    <p:sldId id="258" r:id="rId6"/>
-    <p:sldId id="259" r:id="rId7"/>
+    <p:sldId id="262" r:id="rId6"/>
+    <p:sldId id="258" r:id="rId7"/>
+    <p:sldId id="259" r:id="rId8"/>
   </p:sldIdLst>
   <p:sldSz cx="12192000" cy="6858000"/>
   <p:notesSz cx="6858000" cy="9144000"/>
@@ -5625,10 +5626,10 @@
         </p:nvGrpSpPr>
         <p:grpSpPr>
           <a:xfrm>
-            <a:off x="6223803" y="4690187"/>
-            <a:ext cx="2780829" cy="891160"/>
+            <a:off x="6223803" y="4610779"/>
+            <a:ext cx="2780829" cy="978044"/>
             <a:chOff x="1255912" y="4688039"/>
-            <a:chExt cx="2702771" cy="1043943"/>
+            <a:chExt cx="2702771" cy="1399070"/>
           </a:xfrm>
         </p:grpSpPr>
         <p:sp>
@@ -5640,7 +5641,7 @@
           <p:spPr>
             <a:xfrm>
               <a:off x="1255912" y="4688039"/>
-              <a:ext cx="2702771" cy="1043943"/>
+              <a:ext cx="2702771" cy="1399070"/>
             </a:xfrm>
             <a:prstGeom prst="rect">
               <a:avLst/>
@@ -5673,6 +5674,17 @@
             <a:lstStyle/>
             <a:p>
               <a:pPr algn="ctr"/>
+              <a:r>
+                <a:rPr lang="en-US" dirty="0" smtClean="0">
+                  <a:solidFill>
+                    <a:schemeClr val="tx1">
+                      <a:lumMod val="95000"/>
+                      <a:lumOff val="5000"/>
+                    </a:schemeClr>
+                  </a:solidFill>
+                </a:rPr>
+                <a:t>Technology</a:t>
+              </a:r>
               <a:endParaRPr lang="en-US" dirty="0">
                 <a:solidFill>
                   <a:schemeClr val="tx1">
@@ -5692,7 +5704,7 @@
           </p:nvSpPr>
           <p:spPr>
             <a:xfrm>
-              <a:off x="1887429" y="4711319"/>
+              <a:off x="2386038" y="5026476"/>
               <a:ext cx="1374756" cy="622974"/>
             </a:xfrm>
             <a:prstGeom prst="ellipse">
@@ -5744,7 +5756,7 @@
           </p:nvSpPr>
           <p:spPr>
             <a:xfrm>
-              <a:off x="1905961" y="5131937"/>
+              <a:off x="2421609" y="5498892"/>
               <a:ext cx="1438130" cy="541081"/>
             </a:xfrm>
             <a:prstGeom prst="ellipse">
@@ -6450,35 +6462,127 @@
             <p:ph type="title"/>
           </p:nvPr>
         </p:nvSpPr>
-        <p:spPr/>
+        <p:spPr>
+          <a:xfrm>
+            <a:off x="111512" y="-58580"/>
+            <a:ext cx="10515600" cy="1325563"/>
+          </a:xfrm>
+        </p:spPr>
         <p:txBody>
           <a:bodyPr/>
           <a:lstStyle/>
           <a:p>
             <a:r>
               <a:rPr lang="en-US" dirty="0" err="1" smtClean="0"/>
-              <a:t>Zacman</a:t>
+              <a:t>Zachman</a:t>
             </a:r>
             <a:endParaRPr lang="en-US" dirty="0"/>
           </a:p>
         </p:txBody>
       </p:sp>
-      <p:sp>
-        <p:nvSpPr>
-          <p:cNvPr id="3" name="Content Placeholder 2"/>
-          <p:cNvSpPr>
-            <a:spLocks noGrp="1"/>
-          </p:cNvSpPr>
+      <p:pic>
+        <p:nvPicPr>
+          <p:cNvPr id="1026" name="Picture 2" descr="https://zachman-feac.com/images/ZI_PIcs/ZF3.jpg"/>
+          <p:cNvPicPr>
+            <a:picLocks noGrp="1" noChangeAspect="1" noChangeArrowheads="1"/>
+          </p:cNvPicPr>
           <p:nvPr>
             <p:ph idx="1"/>
           </p:nvPr>
-        </p:nvSpPr>
-        <p:spPr/>
-        <p:txBody>
-          <a:bodyPr/>
-          <a:lstStyle/>
-          <a:p>
-            <a:endParaRPr lang="en-US"/>
+        </p:nvPicPr>
+        <p:blipFill>
+          <a:blip r:embed="rId2">
+            <a:extLst>
+              <a:ext uri="{28A0092B-C50C-407E-A947-70E740481C1C}">
+                <a14:useLocalDpi xmlns:a14="http://schemas.microsoft.com/office/drawing/2010/main" val="0"/>
+              </a:ext>
+            </a:extLst>
+          </a:blip>
+          <a:srcRect/>
+          <a:stretch>
+            <a:fillRect/>
+          </a:stretch>
+        </p:blipFill>
+        <p:spPr bwMode="auto">
+          <a:xfrm>
+            <a:off x="2767361" y="604202"/>
+            <a:ext cx="7859751" cy="6073444"/>
+          </a:xfrm>
+          <a:prstGeom prst="rect">
+            <a:avLst/>
+          </a:prstGeom>
+          <a:noFill/>
+          <a:extLst>
+            <a:ext uri="{909E8E84-426E-40DD-AFC4-6F175D3DCCD1}">
+              <a14:hiddenFill xmlns:a14="http://schemas.microsoft.com/office/drawing/2010/main">
+                <a:solidFill>
+                  <a:srgbClr val="FFFFFF"/>
+                </a:solidFill>
+              </a14:hiddenFill>
+            </a:ext>
+          </a:extLst>
+        </p:spPr>
+      </p:pic>
+      <p:sp>
+        <p:nvSpPr>
+          <p:cNvPr id="4" name="TextBox 3"/>
+          <p:cNvSpPr txBox="1"/>
+          <p:nvPr/>
+        </p:nvSpPr>
+        <p:spPr>
+          <a:xfrm>
+            <a:off x="0" y="2753710"/>
+            <a:ext cx="2767361" cy="3139321"/>
+          </a:xfrm>
+          <a:prstGeom prst="rect">
+            <a:avLst/>
+          </a:prstGeom>
+          <a:noFill/>
+        </p:spPr>
+        <p:txBody>
+          <a:bodyPr wrap="square" rtlCol="0">
+            <a:spAutoFit/>
+          </a:bodyPr>
+          <a:lstStyle/>
+          <a:p>
+            <a:r>
+              <a:rPr lang="en-US" dirty="0" smtClean="0"/>
+              <a:t>Zach man only set context  but not more Architect thinking</a:t>
+            </a:r>
+          </a:p>
+          <a:p>
+            <a:endParaRPr lang="en-US" dirty="0"/>
+          </a:p>
+          <a:p>
+            <a:r>
+              <a:rPr lang="en-US" dirty="0" smtClean="0"/>
+              <a:t>Architect is responsible at each level</a:t>
+            </a:r>
+          </a:p>
+          <a:p>
+            <a:r>
+              <a:rPr lang="en-US" dirty="0" smtClean="0"/>
+              <a:t>2 major stake holder</a:t>
+            </a:r>
+          </a:p>
+          <a:p>
+            <a:r>
+              <a:rPr lang="en-US" dirty="0" smtClean="0"/>
+              <a:t>Provider &amp; Implementer</a:t>
+            </a:r>
+          </a:p>
+          <a:p>
+            <a:r>
+              <a:rPr lang="en-US" dirty="0" smtClean="0"/>
+              <a:t>2 thing more important </a:t>
+            </a:r>
+          </a:p>
+          <a:p>
+            <a:r>
+              <a:rPr lang="en-US" dirty="0" smtClean="0"/>
+              <a:t>Data (What) How (Logic) rest is optional </a:t>
+            </a:r>
+            <a:endParaRPr lang="en-US" dirty="0"/>
           </a:p>
         </p:txBody>
       </p:sp>
@@ -6522,6 +6626,83 @@
             <p:ph type="title"/>
           </p:nvPr>
         </p:nvSpPr>
+        <p:spPr>
+          <a:xfrm>
+            <a:off x="112986" y="102366"/>
+            <a:ext cx="10515600" cy="1325563"/>
+          </a:xfrm>
+        </p:spPr>
+        <p:txBody>
+          <a:bodyPr/>
+          <a:lstStyle/>
+          <a:p>
+            <a:r>
+              <a:rPr lang="en-US" dirty="0" smtClean="0"/>
+              <a:t>TOGAF</a:t>
+            </a:r>
+            <a:endParaRPr lang="en-US" dirty="0"/>
+          </a:p>
+        </p:txBody>
+      </p:sp>
+      <p:sp>
+        <p:nvSpPr>
+          <p:cNvPr id="3" name="Content Placeholder 2"/>
+          <p:cNvSpPr>
+            <a:spLocks noGrp="1"/>
+          </p:cNvSpPr>
+          <p:nvPr>
+            <p:ph idx="1"/>
+          </p:nvPr>
+        </p:nvSpPr>
+        <p:spPr/>
+        <p:txBody>
+          <a:bodyPr/>
+          <a:lstStyle/>
+          <a:p>
+            <a:endParaRPr lang="en-US"/>
+          </a:p>
+        </p:txBody>
+      </p:sp>
+    </p:spTree>
+    <p:extLst>
+      <p:ext uri="{BB962C8B-B14F-4D97-AF65-F5344CB8AC3E}">
+        <p14:creationId xmlns:p14="http://schemas.microsoft.com/office/powerpoint/2010/main" val="1843729758"/>
+      </p:ext>
+    </p:extLst>
+  </p:cSld>
+  <p:clrMapOvr>
+    <a:masterClrMapping/>
+  </p:clrMapOvr>
+</p:sld>
+</file>
+
+<file path=ppt/slides/slide6.xml><?xml version="1.0" encoding="utf-8"?>
+<p:sld xmlns:a="http://schemas.openxmlformats.org/drawingml/2006/main" xmlns:r="http://schemas.openxmlformats.org/officeDocument/2006/relationships" xmlns:p="http://schemas.openxmlformats.org/presentationml/2006/main">
+  <p:cSld>
+    <p:spTree>
+      <p:nvGrpSpPr>
+        <p:cNvPr id="1" name=""/>
+        <p:cNvGrpSpPr/>
+        <p:nvPr/>
+      </p:nvGrpSpPr>
+      <p:grpSpPr>
+        <a:xfrm>
+          <a:off x="0" y="0"/>
+          <a:ext cx="0" cy="0"/>
+          <a:chOff x="0" y="0"/>
+          <a:chExt cx="0" cy="0"/>
+        </a:xfrm>
+      </p:grpSpPr>
+      <p:sp>
+        <p:nvSpPr>
+          <p:cNvPr id="2" name="Title 1"/>
+          <p:cNvSpPr>
+            <a:spLocks noGrp="1"/>
+          </p:cNvSpPr>
+          <p:nvPr>
+            <p:ph type="title"/>
+          </p:nvPr>
+        </p:nvSpPr>
         <p:spPr/>
         <p:txBody>
           <a:bodyPr/>
@@ -7043,7 +7224,7 @@
 </p:sld>
 </file>
 
-<file path=ppt/slides/slide6.xml><?xml version="1.0" encoding="utf-8"?>
+<file path=ppt/slides/slide7.xml><?xml version="1.0" encoding="utf-8"?>
 <p:sld xmlns:a="http://schemas.openxmlformats.org/drawingml/2006/main" xmlns:r="http://schemas.openxmlformats.org/officeDocument/2006/relationships" xmlns:p="http://schemas.openxmlformats.org/presentationml/2006/main">
   <p:cSld>
     <p:spTree>

</xml_diff>

<commit_message>
Fine tune few Architect slide ,WIP...
</commit_message>
<xml_diff>
--- a/interview/Architecture.pptx
+++ b/interview/Architecture.pptx
@@ -10,8 +10,9 @@
     <p:sldId id="260" r:id="rId4"/>
     <p:sldId id="261" r:id="rId5"/>
     <p:sldId id="262" r:id="rId6"/>
-    <p:sldId id="258" r:id="rId7"/>
-    <p:sldId id="259" r:id="rId8"/>
+    <p:sldId id="263" r:id="rId7"/>
+    <p:sldId id="258" r:id="rId8"/>
+    <p:sldId id="259" r:id="rId9"/>
   </p:sldIdLst>
   <p:sldSz cx="12192000" cy="6858000"/>
   <p:notesSz cx="6858000" cy="9144000"/>
@@ -249,7 +250,7 @@
           <a:p>
             <a:fld id="{A9EA6C2F-DDD7-47BE-89A1-39ECA27DEEB2}" type="datetimeFigureOut">
               <a:rPr lang="en-US" smtClean="0"/>
-              <a:t>8/12/2024</a:t>
+              <a:t>8/22/2024</a:t>
             </a:fld>
             <a:endParaRPr lang="en-US"/>
           </a:p>
@@ -419,7 +420,7 @@
           <a:p>
             <a:fld id="{A9EA6C2F-DDD7-47BE-89A1-39ECA27DEEB2}" type="datetimeFigureOut">
               <a:rPr lang="en-US" smtClean="0"/>
-              <a:t>8/12/2024</a:t>
+              <a:t>8/22/2024</a:t>
             </a:fld>
             <a:endParaRPr lang="en-US"/>
           </a:p>
@@ -599,7 +600,7 @@
           <a:p>
             <a:fld id="{A9EA6C2F-DDD7-47BE-89A1-39ECA27DEEB2}" type="datetimeFigureOut">
               <a:rPr lang="en-US" smtClean="0"/>
-              <a:t>8/12/2024</a:t>
+              <a:t>8/22/2024</a:t>
             </a:fld>
             <a:endParaRPr lang="en-US"/>
           </a:p>
@@ -769,7 +770,7 @@
           <a:p>
             <a:fld id="{A9EA6C2F-DDD7-47BE-89A1-39ECA27DEEB2}" type="datetimeFigureOut">
               <a:rPr lang="en-US" smtClean="0"/>
-              <a:t>8/12/2024</a:t>
+              <a:t>8/22/2024</a:t>
             </a:fld>
             <a:endParaRPr lang="en-US"/>
           </a:p>
@@ -1015,7 +1016,7 @@
           <a:p>
             <a:fld id="{A9EA6C2F-DDD7-47BE-89A1-39ECA27DEEB2}" type="datetimeFigureOut">
               <a:rPr lang="en-US" smtClean="0"/>
-              <a:t>8/12/2024</a:t>
+              <a:t>8/22/2024</a:t>
             </a:fld>
             <a:endParaRPr lang="en-US"/>
           </a:p>
@@ -1247,7 +1248,7 @@
           <a:p>
             <a:fld id="{A9EA6C2F-DDD7-47BE-89A1-39ECA27DEEB2}" type="datetimeFigureOut">
               <a:rPr lang="en-US" smtClean="0"/>
-              <a:t>8/12/2024</a:t>
+              <a:t>8/22/2024</a:t>
             </a:fld>
             <a:endParaRPr lang="en-US"/>
           </a:p>
@@ -1614,7 +1615,7 @@
           <a:p>
             <a:fld id="{A9EA6C2F-DDD7-47BE-89A1-39ECA27DEEB2}" type="datetimeFigureOut">
               <a:rPr lang="en-US" smtClean="0"/>
-              <a:t>8/12/2024</a:t>
+              <a:t>8/22/2024</a:t>
             </a:fld>
             <a:endParaRPr lang="en-US"/>
           </a:p>
@@ -1732,7 +1733,7 @@
           <a:p>
             <a:fld id="{A9EA6C2F-DDD7-47BE-89A1-39ECA27DEEB2}" type="datetimeFigureOut">
               <a:rPr lang="en-US" smtClean="0"/>
-              <a:t>8/12/2024</a:t>
+              <a:t>8/22/2024</a:t>
             </a:fld>
             <a:endParaRPr lang="en-US"/>
           </a:p>
@@ -1827,7 +1828,7 @@
           <a:p>
             <a:fld id="{A9EA6C2F-DDD7-47BE-89A1-39ECA27DEEB2}" type="datetimeFigureOut">
               <a:rPr lang="en-US" smtClean="0"/>
-              <a:t>8/12/2024</a:t>
+              <a:t>8/22/2024</a:t>
             </a:fld>
             <a:endParaRPr lang="en-US"/>
           </a:p>
@@ -2104,7 +2105,7 @@
           <a:p>
             <a:fld id="{A9EA6C2F-DDD7-47BE-89A1-39ECA27DEEB2}" type="datetimeFigureOut">
               <a:rPr lang="en-US" smtClean="0"/>
-              <a:t>8/12/2024</a:t>
+              <a:t>8/22/2024</a:t>
             </a:fld>
             <a:endParaRPr lang="en-US"/>
           </a:p>
@@ -2357,7 +2358,7 @@
           <a:p>
             <a:fld id="{A9EA6C2F-DDD7-47BE-89A1-39ECA27DEEB2}" type="datetimeFigureOut">
               <a:rPr lang="en-US" smtClean="0"/>
-              <a:t>8/12/2024</a:t>
+              <a:t>8/22/2024</a:t>
             </a:fld>
             <a:endParaRPr lang="en-US"/>
           </a:p>
@@ -2570,7 +2571,7 @@
           <a:p>
             <a:fld id="{A9EA6C2F-DDD7-47BE-89A1-39ECA27DEEB2}" type="datetimeFigureOut">
               <a:rPr lang="en-US" smtClean="0"/>
-              <a:t>8/12/2024</a:t>
+              <a:t>8/22/2024</a:t>
             </a:fld>
             <a:endParaRPr lang="en-US"/>
           </a:p>
@@ -2983,12 +2984,24 @@
         </p:nvSpPr>
         <p:spPr>
           <a:xfrm>
-            <a:off x="1227908" y="770708"/>
+            <a:off x="2170443" y="770708"/>
             <a:ext cx="2547257" cy="1188720"/>
           </a:xfrm>
           <a:prstGeom prst="rect">
             <a:avLst/>
           </a:prstGeom>
+          <a:solidFill>
+            <a:schemeClr val="accent6">
+              <a:lumMod val="50000"/>
+            </a:schemeClr>
+          </a:solidFill>
+          <a:ln>
+            <a:solidFill>
+              <a:schemeClr val="accent6">
+                <a:lumMod val="50000"/>
+              </a:schemeClr>
+            </a:solidFill>
+          </a:ln>
         </p:spPr>
         <p:style>
           <a:lnRef idx="2">
@@ -3027,12 +3040,17 @@
         </p:nvSpPr>
         <p:spPr>
           <a:xfrm>
-            <a:off x="1227908" y="2399211"/>
+            <a:off x="2170443" y="2399211"/>
             <a:ext cx="2547257" cy="1188720"/>
           </a:xfrm>
           <a:prstGeom prst="rect">
             <a:avLst/>
           </a:prstGeom>
+          <a:solidFill>
+            <a:schemeClr val="bg2">
+              <a:lumMod val="50000"/>
+            </a:schemeClr>
+          </a:solidFill>
         </p:spPr>
         <p:style>
           <a:lnRef idx="2">
@@ -3071,7 +3089,7 @@
         </p:nvSpPr>
         <p:spPr>
           <a:xfrm>
-            <a:off x="4415246" y="2399211"/>
+            <a:off x="5357781" y="2399211"/>
             <a:ext cx="3082834" cy="914400"/>
           </a:xfrm>
           <a:prstGeom prst="roundRect">
@@ -3122,7 +3140,7 @@
         </p:nvSpPr>
         <p:spPr>
           <a:xfrm>
-            <a:off x="4415246" y="3492137"/>
+            <a:off x="5357781" y="3492137"/>
             <a:ext cx="3082834" cy="914400"/>
           </a:xfrm>
           <a:prstGeom prst="roundRect">
@@ -3166,7 +3184,63 @@
         </p:nvSpPr>
         <p:spPr>
           <a:xfrm>
-            <a:off x="4415246" y="4585063"/>
+            <a:off x="5357781" y="4585063"/>
+            <a:ext cx="3082834" cy="914400"/>
+          </a:xfrm>
+          <a:prstGeom prst="roundRect">
+            <a:avLst/>
+          </a:prstGeom>
+          <a:solidFill>
+            <a:schemeClr val="accent6">
+              <a:lumMod val="75000"/>
+            </a:schemeClr>
+          </a:solidFill>
+        </p:spPr>
+        <p:style>
+          <a:lnRef idx="2">
+            <a:schemeClr val="accent1">
+              <a:shade val="50000"/>
+            </a:schemeClr>
+          </a:lnRef>
+          <a:fillRef idx="1">
+            <a:schemeClr val="accent1"/>
+          </a:fillRef>
+          <a:effectRef idx="0">
+            <a:schemeClr val="accent1"/>
+          </a:effectRef>
+          <a:fontRef idx="minor">
+            <a:schemeClr val="lt1"/>
+          </a:fontRef>
+        </p:style>
+        <p:txBody>
+          <a:bodyPr rtlCol="0" anchor="ctr"/>
+          <a:lstStyle/>
+          <a:p>
+            <a:pPr algn="ctr"/>
+            <a:r>
+              <a:rPr lang="en-US" dirty="0" smtClean="0"/>
+              <a:t>Re  Engineering </a:t>
+            </a:r>
+            <a:endParaRPr lang="en-US" dirty="0"/>
+          </a:p>
+          <a:p>
+            <a:pPr algn="ctr"/>
+            <a:r>
+              <a:rPr lang="en-US" dirty="0" smtClean="0"/>
+              <a:t>( new design )</a:t>
+            </a:r>
+          </a:p>
+        </p:txBody>
+      </p:sp>
+      <p:sp>
+        <p:nvSpPr>
+          <p:cNvPr id="9" name="Rounded Rectangle 8"/>
+          <p:cNvSpPr/>
+          <p:nvPr/>
+        </p:nvSpPr>
+        <p:spPr>
+          <a:xfrm>
+            <a:off x="5357781" y="5677989"/>
             <a:ext cx="3082834" cy="914400"/>
           </a:xfrm>
           <a:prstGeom prst="roundRect">
@@ -3196,62 +3270,1222 @@
             <a:pPr algn="ctr"/>
             <a:r>
               <a:rPr lang="en-US" dirty="0" smtClean="0"/>
-              <a:t>Re  Engineering </a:t>
-            </a:r>
-            <a:endParaRPr lang="en-US" dirty="0"/>
-          </a:p>
-          <a:p>
-            <a:pPr algn="ctr"/>
-            <a:r>
-              <a:rPr lang="en-US" dirty="0" smtClean="0"/>
-              <a:t>( new design )</a:t>
-            </a:r>
-          </a:p>
-        </p:txBody>
-      </p:sp>
-      <p:sp>
-        <p:nvSpPr>
-          <p:cNvPr id="9" name="Rounded Rectangle 8"/>
-          <p:cNvSpPr/>
+              <a:t>Retire</a:t>
+            </a:r>
+          </a:p>
+        </p:txBody>
+      </p:sp>
+      <p:cxnSp>
+        <p:nvCxnSpPr>
+          <p:cNvPr id="3" name="Elbow Connector 2"/>
+          <p:cNvCxnSpPr>
+            <a:stCxn id="5" idx="3"/>
+            <a:endCxn id="6" idx="1"/>
+          </p:cNvCxnSpPr>
           <p:nvPr/>
-        </p:nvSpPr>
+        </p:nvCxnSpPr>
+        <p:spPr>
+          <a:xfrm flipV="1">
+            <a:off x="4717700" y="2856411"/>
+            <a:ext cx="640081" cy="137160"/>
+          </a:xfrm>
+          <a:prstGeom prst="bentConnector3">
+            <a:avLst/>
+          </a:prstGeom>
+          <a:ln>
+            <a:tailEnd type="triangle"/>
+          </a:ln>
+        </p:spPr>
+        <p:style>
+          <a:lnRef idx="1">
+            <a:schemeClr val="accent1"/>
+          </a:lnRef>
+          <a:fillRef idx="0">
+            <a:schemeClr val="accent1"/>
+          </a:fillRef>
+          <a:effectRef idx="0">
+            <a:schemeClr val="accent1"/>
+          </a:effectRef>
+          <a:fontRef idx="minor">
+            <a:schemeClr val="tx1"/>
+          </a:fontRef>
+        </p:style>
+      </p:cxnSp>
+      <p:cxnSp>
+        <p:nvCxnSpPr>
+          <p:cNvPr id="11" name="Elbow Connector 10"/>
+          <p:cNvCxnSpPr>
+            <a:stCxn id="5" idx="3"/>
+            <a:endCxn id="7" idx="1"/>
+          </p:cNvCxnSpPr>
+          <p:nvPr/>
+        </p:nvCxnSpPr>
         <p:spPr>
           <a:xfrm>
-            <a:off x="4415246" y="5677989"/>
-            <a:ext cx="3082834" cy="914400"/>
-          </a:xfrm>
-          <a:prstGeom prst="roundRect">
+            <a:off x="4717700" y="2993571"/>
+            <a:ext cx="640081" cy="955766"/>
+          </a:xfrm>
+          <a:prstGeom prst="bentConnector3">
             <a:avLst/>
           </a:prstGeom>
+          <a:ln>
+            <a:tailEnd type="triangle"/>
+          </a:ln>
         </p:spPr>
         <p:style>
-          <a:lnRef idx="2">
-            <a:schemeClr val="accent1">
-              <a:shade val="50000"/>
-            </a:schemeClr>
+          <a:lnRef idx="1">
+            <a:schemeClr val="accent1"/>
           </a:lnRef>
-          <a:fillRef idx="1">
+          <a:fillRef idx="0">
             <a:schemeClr val="accent1"/>
           </a:fillRef>
           <a:effectRef idx="0">
             <a:schemeClr val="accent1"/>
           </a:effectRef>
           <a:fontRef idx="minor">
-            <a:schemeClr val="lt1"/>
+            <a:schemeClr val="tx1"/>
           </a:fontRef>
         </p:style>
-        <p:txBody>
-          <a:bodyPr rtlCol="0" anchor="ctr"/>
-          <a:lstStyle/>
-          <a:p>
-            <a:pPr algn="ctr"/>
-            <a:r>
-              <a:rPr lang="en-US" dirty="0" smtClean="0"/>
-              <a:t>Retire</a:t>
-            </a:r>
-          </a:p>
-        </p:txBody>
-      </p:sp>
+      </p:cxnSp>
+      <p:cxnSp>
+        <p:nvCxnSpPr>
+          <p:cNvPr id="13" name="Elbow Connector 12"/>
+          <p:cNvCxnSpPr>
+            <a:stCxn id="5" idx="3"/>
+            <a:endCxn id="8" idx="1"/>
+          </p:cNvCxnSpPr>
+          <p:nvPr/>
+        </p:nvCxnSpPr>
+        <p:spPr>
+          <a:xfrm>
+            <a:off x="4717700" y="2993571"/>
+            <a:ext cx="640081" cy="2048692"/>
+          </a:xfrm>
+          <a:prstGeom prst="bentConnector3">
+            <a:avLst/>
+          </a:prstGeom>
+          <a:ln>
+            <a:tailEnd type="triangle"/>
+          </a:ln>
+        </p:spPr>
+        <p:style>
+          <a:lnRef idx="1">
+            <a:schemeClr val="accent1"/>
+          </a:lnRef>
+          <a:fillRef idx="0">
+            <a:schemeClr val="accent1"/>
+          </a:fillRef>
+          <a:effectRef idx="0">
+            <a:schemeClr val="accent1"/>
+          </a:effectRef>
+          <a:fontRef idx="minor">
+            <a:schemeClr val="tx1"/>
+          </a:fontRef>
+        </p:style>
+      </p:cxnSp>
+      <p:cxnSp>
+        <p:nvCxnSpPr>
+          <p:cNvPr id="15" name="Elbow Connector 14"/>
+          <p:cNvCxnSpPr>
+            <a:stCxn id="5" idx="3"/>
+            <a:endCxn id="9" idx="1"/>
+          </p:cNvCxnSpPr>
+          <p:nvPr/>
+        </p:nvCxnSpPr>
+        <p:spPr>
+          <a:xfrm>
+            <a:off x="4717700" y="2993571"/>
+            <a:ext cx="640081" cy="3141618"/>
+          </a:xfrm>
+          <a:prstGeom prst="bentConnector3">
+            <a:avLst/>
+          </a:prstGeom>
+          <a:ln>
+            <a:tailEnd type="triangle"/>
+          </a:ln>
+        </p:spPr>
+        <p:style>
+          <a:lnRef idx="1">
+            <a:schemeClr val="accent1"/>
+          </a:lnRef>
+          <a:fillRef idx="0">
+            <a:schemeClr val="accent1"/>
+          </a:fillRef>
+          <a:effectRef idx="0">
+            <a:schemeClr val="accent1"/>
+          </a:effectRef>
+          <a:fontRef idx="minor">
+            <a:schemeClr val="tx1"/>
+          </a:fontRef>
+        </p:style>
+      </p:cxnSp>
+      <p:cxnSp>
+        <p:nvCxnSpPr>
+          <p:cNvPr id="17" name="Elbow Connector 16"/>
+          <p:cNvCxnSpPr>
+            <a:stCxn id="4" idx="3"/>
+            <a:endCxn id="8" idx="1"/>
+          </p:cNvCxnSpPr>
+          <p:nvPr/>
+        </p:nvCxnSpPr>
+        <p:spPr>
+          <a:xfrm>
+            <a:off x="4717700" y="1365068"/>
+            <a:ext cx="640081" cy="3677195"/>
+          </a:xfrm>
+          <a:prstGeom prst="bentConnector3">
+            <a:avLst/>
+          </a:prstGeom>
+          <a:ln w="28575">
+            <a:solidFill>
+              <a:schemeClr val="accent6">
+                <a:lumMod val="50000"/>
+              </a:schemeClr>
+            </a:solidFill>
+            <a:tailEnd type="triangle"/>
+          </a:ln>
+        </p:spPr>
+        <p:style>
+          <a:lnRef idx="1">
+            <a:schemeClr val="accent1"/>
+          </a:lnRef>
+          <a:fillRef idx="0">
+            <a:schemeClr val="accent1"/>
+          </a:fillRef>
+          <a:effectRef idx="0">
+            <a:schemeClr val="accent1"/>
+          </a:effectRef>
+          <a:fontRef idx="minor">
+            <a:schemeClr val="tx1"/>
+          </a:fontRef>
+        </p:style>
+      </p:cxnSp>
+      <p:grpSp>
+        <p:nvGrpSpPr>
+          <p:cNvPr id="41" name="Group 40"/>
+          <p:cNvGrpSpPr/>
+          <p:nvPr/>
+        </p:nvGrpSpPr>
+        <p:grpSpPr>
+          <a:xfrm>
+            <a:off x="258270" y="1943233"/>
+            <a:ext cx="1452642" cy="911956"/>
+            <a:chOff x="9614780" y="1460530"/>
+            <a:chExt cx="1452642" cy="911956"/>
+          </a:xfrm>
+        </p:grpSpPr>
+        <p:grpSp>
+          <p:nvGrpSpPr>
+            <p:cNvPr id="18" name="Group 17"/>
+            <p:cNvGrpSpPr/>
+            <p:nvPr/>
+          </p:nvGrpSpPr>
+          <p:grpSpPr>
+            <a:xfrm>
+              <a:off x="9890133" y="1460530"/>
+              <a:ext cx="298823" cy="526596"/>
+              <a:chOff x="10883527" y="2257425"/>
+              <a:chExt cx="460748" cy="1040946"/>
+            </a:xfrm>
+            <a:solidFill>
+              <a:srgbClr val="7030A0"/>
+            </a:solidFill>
+          </p:grpSpPr>
+          <p:cxnSp>
+            <p:nvCxnSpPr>
+              <p:cNvPr id="19" name="Straight Connector 18"/>
+              <p:cNvCxnSpPr>
+                <a:stCxn id="20" idx="4"/>
+              </p:cNvCxnSpPr>
+              <p:nvPr/>
+            </p:nvCxnSpPr>
+            <p:spPr>
+              <a:xfrm>
+                <a:off x="11087100" y="2466975"/>
+                <a:ext cx="19050" cy="485775"/>
+              </a:xfrm>
+              <a:prstGeom prst="line">
+                <a:avLst/>
+              </a:prstGeom>
+              <a:grpFill/>
+              <a:ln w="38100">
+                <a:solidFill>
+                  <a:srgbClr val="C00000"/>
+                </a:solidFill>
+              </a:ln>
+            </p:spPr>
+            <p:style>
+              <a:lnRef idx="1">
+                <a:schemeClr val="accent1"/>
+              </a:lnRef>
+              <a:fillRef idx="0">
+                <a:schemeClr val="accent1"/>
+              </a:fillRef>
+              <a:effectRef idx="0">
+                <a:schemeClr val="accent1"/>
+              </a:effectRef>
+              <a:fontRef idx="minor">
+                <a:schemeClr val="tx1"/>
+              </a:fontRef>
+            </p:style>
+          </p:cxnSp>
+          <p:sp>
+            <p:nvSpPr>
+              <p:cNvPr id="20" name="Oval 19"/>
+              <p:cNvSpPr/>
+              <p:nvPr/>
+            </p:nvSpPr>
+            <p:spPr>
+              <a:xfrm>
+                <a:off x="10991850" y="2257425"/>
+                <a:ext cx="190500" cy="209550"/>
+              </a:xfrm>
+              <a:prstGeom prst="ellipse">
+                <a:avLst/>
+              </a:prstGeom>
+              <a:grpFill/>
+              <a:ln>
+                <a:solidFill>
+                  <a:srgbClr val="C00000"/>
+                </a:solidFill>
+              </a:ln>
+            </p:spPr>
+            <p:style>
+              <a:lnRef idx="2">
+                <a:schemeClr val="accent1">
+                  <a:shade val="50000"/>
+                </a:schemeClr>
+              </a:lnRef>
+              <a:fillRef idx="1">
+                <a:schemeClr val="accent1"/>
+              </a:fillRef>
+              <a:effectRef idx="0">
+                <a:schemeClr val="accent1"/>
+              </a:effectRef>
+              <a:fontRef idx="minor">
+                <a:schemeClr val="lt1"/>
+              </a:fontRef>
+            </p:style>
+            <p:txBody>
+              <a:bodyPr rtlCol="0" anchor="ctr"/>
+              <a:lstStyle/>
+              <a:p>
+                <a:pPr algn="ctr"/>
+                <a:endParaRPr lang="en-US"/>
+              </a:p>
+            </p:txBody>
+          </p:sp>
+          <p:cxnSp>
+            <p:nvCxnSpPr>
+              <p:cNvPr id="21" name="Straight Connector 20"/>
+              <p:cNvCxnSpPr/>
+              <p:nvPr/>
+            </p:nvCxnSpPr>
+            <p:spPr>
+              <a:xfrm flipH="1">
+                <a:off x="10972800" y="2952750"/>
+                <a:ext cx="123825" cy="345621"/>
+              </a:xfrm>
+              <a:prstGeom prst="line">
+                <a:avLst/>
+              </a:prstGeom>
+              <a:grpFill/>
+              <a:ln w="38100">
+                <a:solidFill>
+                  <a:srgbClr val="C00000"/>
+                </a:solidFill>
+              </a:ln>
+            </p:spPr>
+            <p:style>
+              <a:lnRef idx="1">
+                <a:schemeClr val="accent1"/>
+              </a:lnRef>
+              <a:fillRef idx="0">
+                <a:schemeClr val="accent1"/>
+              </a:fillRef>
+              <a:effectRef idx="0">
+                <a:schemeClr val="accent1"/>
+              </a:effectRef>
+              <a:fontRef idx="minor">
+                <a:schemeClr val="tx1"/>
+              </a:fontRef>
+            </p:style>
+          </p:cxnSp>
+          <p:cxnSp>
+            <p:nvCxnSpPr>
+              <p:cNvPr id="22" name="Straight Connector 21"/>
+              <p:cNvCxnSpPr/>
+              <p:nvPr/>
+            </p:nvCxnSpPr>
+            <p:spPr>
+              <a:xfrm>
+                <a:off x="11106150" y="2952750"/>
+                <a:ext cx="238125" cy="276225"/>
+              </a:xfrm>
+              <a:prstGeom prst="line">
+                <a:avLst/>
+              </a:prstGeom>
+              <a:grpFill/>
+              <a:ln w="38100">
+                <a:solidFill>
+                  <a:srgbClr val="C00000"/>
+                </a:solidFill>
+              </a:ln>
+            </p:spPr>
+            <p:style>
+              <a:lnRef idx="1">
+                <a:schemeClr val="accent1"/>
+              </a:lnRef>
+              <a:fillRef idx="0">
+                <a:schemeClr val="accent1"/>
+              </a:fillRef>
+              <a:effectRef idx="0">
+                <a:schemeClr val="accent1"/>
+              </a:effectRef>
+              <a:fontRef idx="minor">
+                <a:schemeClr val="tx1"/>
+              </a:fontRef>
+            </p:style>
+          </p:cxnSp>
+          <p:cxnSp>
+            <p:nvCxnSpPr>
+              <p:cNvPr id="23" name="Straight Connector 22"/>
+              <p:cNvCxnSpPr/>
+              <p:nvPr/>
+            </p:nvCxnSpPr>
+            <p:spPr>
+              <a:xfrm>
+                <a:off x="10883527" y="2625633"/>
+                <a:ext cx="460748" cy="0"/>
+              </a:xfrm>
+              <a:prstGeom prst="line">
+                <a:avLst/>
+              </a:prstGeom>
+              <a:grpFill/>
+              <a:ln w="38100">
+                <a:solidFill>
+                  <a:srgbClr val="C00000"/>
+                </a:solidFill>
+              </a:ln>
+            </p:spPr>
+            <p:style>
+              <a:lnRef idx="1">
+                <a:schemeClr val="accent1"/>
+              </a:lnRef>
+              <a:fillRef idx="0">
+                <a:schemeClr val="accent1"/>
+              </a:fillRef>
+              <a:effectRef idx="0">
+                <a:schemeClr val="accent1"/>
+              </a:effectRef>
+              <a:fontRef idx="minor">
+                <a:schemeClr val="tx1"/>
+              </a:fontRef>
+            </p:style>
+          </p:cxnSp>
+        </p:grpSp>
+        <p:sp>
+          <p:nvSpPr>
+            <p:cNvPr id="24" name="TextBox 23"/>
+            <p:cNvSpPr txBox="1"/>
+            <p:nvPr/>
+          </p:nvSpPr>
+          <p:spPr>
+            <a:xfrm>
+              <a:off x="9614780" y="2110876"/>
+              <a:ext cx="1452642" cy="261610"/>
+            </a:xfrm>
+            <a:prstGeom prst="rect">
+              <a:avLst/>
+            </a:prstGeom>
+            <a:noFill/>
+          </p:spPr>
+          <p:txBody>
+            <a:bodyPr wrap="none" rtlCol="0">
+              <a:spAutoFit/>
+            </a:bodyPr>
+            <a:lstStyle/>
+            <a:p>
+              <a:r>
+                <a:rPr lang="en-US" sz="1100" dirty="0" smtClean="0"/>
+                <a:t>Requirement Provider</a:t>
+              </a:r>
+              <a:endParaRPr lang="en-US" sz="1100" dirty="0"/>
+            </a:p>
+          </p:txBody>
+        </p:sp>
+      </p:grpSp>
+      <p:grpSp>
+        <p:nvGrpSpPr>
+          <p:cNvPr id="40" name="Group 39"/>
+          <p:cNvGrpSpPr/>
+          <p:nvPr/>
+        </p:nvGrpSpPr>
+        <p:grpSpPr>
+          <a:xfrm>
+            <a:off x="9319286" y="3235795"/>
+            <a:ext cx="1713931" cy="1095467"/>
+            <a:chOff x="9319286" y="3235795"/>
+            <a:chExt cx="1713931" cy="1095467"/>
+          </a:xfrm>
+        </p:grpSpPr>
+        <p:grpSp>
+          <p:nvGrpSpPr>
+            <p:cNvPr id="25" name="Group 24"/>
+            <p:cNvGrpSpPr/>
+            <p:nvPr/>
+          </p:nvGrpSpPr>
+          <p:grpSpPr>
+            <a:xfrm>
+              <a:off x="9746957" y="3235795"/>
+              <a:ext cx="298823" cy="526596"/>
+              <a:chOff x="10883527" y="2257425"/>
+              <a:chExt cx="460748" cy="1040946"/>
+            </a:xfrm>
+            <a:solidFill>
+              <a:srgbClr val="FF0000"/>
+            </a:solidFill>
+          </p:grpSpPr>
+          <p:cxnSp>
+            <p:nvCxnSpPr>
+              <p:cNvPr id="26" name="Straight Connector 25"/>
+              <p:cNvCxnSpPr>
+                <a:stCxn id="27" idx="4"/>
+              </p:cNvCxnSpPr>
+              <p:nvPr/>
+            </p:nvCxnSpPr>
+            <p:spPr>
+              <a:xfrm>
+                <a:off x="11087100" y="2466975"/>
+                <a:ext cx="19050" cy="485775"/>
+              </a:xfrm>
+              <a:prstGeom prst="line">
+                <a:avLst/>
+              </a:prstGeom>
+              <a:grpFill/>
+              <a:ln w="38100">
+                <a:solidFill>
+                  <a:srgbClr val="00B050"/>
+                </a:solidFill>
+              </a:ln>
+            </p:spPr>
+            <p:style>
+              <a:lnRef idx="1">
+                <a:schemeClr val="accent1"/>
+              </a:lnRef>
+              <a:fillRef idx="0">
+                <a:schemeClr val="accent1"/>
+              </a:fillRef>
+              <a:effectRef idx="0">
+                <a:schemeClr val="accent1"/>
+              </a:effectRef>
+              <a:fontRef idx="minor">
+                <a:schemeClr val="tx1"/>
+              </a:fontRef>
+            </p:style>
+          </p:cxnSp>
+          <p:sp>
+            <p:nvSpPr>
+              <p:cNvPr id="27" name="Oval 26"/>
+              <p:cNvSpPr/>
+              <p:nvPr/>
+            </p:nvSpPr>
+            <p:spPr>
+              <a:xfrm>
+                <a:off x="10991850" y="2257425"/>
+                <a:ext cx="190500" cy="209550"/>
+              </a:xfrm>
+              <a:prstGeom prst="ellipse">
+                <a:avLst/>
+              </a:prstGeom>
+              <a:grpFill/>
+              <a:ln>
+                <a:solidFill>
+                  <a:srgbClr val="00B050"/>
+                </a:solidFill>
+              </a:ln>
+            </p:spPr>
+            <p:style>
+              <a:lnRef idx="2">
+                <a:schemeClr val="accent1">
+                  <a:shade val="50000"/>
+                </a:schemeClr>
+              </a:lnRef>
+              <a:fillRef idx="1">
+                <a:schemeClr val="accent1"/>
+              </a:fillRef>
+              <a:effectRef idx="0">
+                <a:schemeClr val="accent1"/>
+              </a:effectRef>
+              <a:fontRef idx="minor">
+                <a:schemeClr val="lt1"/>
+              </a:fontRef>
+            </p:style>
+            <p:txBody>
+              <a:bodyPr rtlCol="0" anchor="ctr"/>
+              <a:lstStyle/>
+              <a:p>
+                <a:pPr algn="ctr"/>
+                <a:endParaRPr lang="en-US"/>
+              </a:p>
+            </p:txBody>
+          </p:sp>
+          <p:cxnSp>
+            <p:nvCxnSpPr>
+              <p:cNvPr id="28" name="Straight Connector 27"/>
+              <p:cNvCxnSpPr/>
+              <p:nvPr/>
+            </p:nvCxnSpPr>
+            <p:spPr>
+              <a:xfrm flipH="1">
+                <a:off x="10972800" y="2952750"/>
+                <a:ext cx="123825" cy="345621"/>
+              </a:xfrm>
+              <a:prstGeom prst="line">
+                <a:avLst/>
+              </a:prstGeom>
+              <a:grpFill/>
+              <a:ln w="38100">
+                <a:solidFill>
+                  <a:srgbClr val="00B050"/>
+                </a:solidFill>
+              </a:ln>
+            </p:spPr>
+            <p:style>
+              <a:lnRef idx="1">
+                <a:schemeClr val="accent1"/>
+              </a:lnRef>
+              <a:fillRef idx="0">
+                <a:schemeClr val="accent1"/>
+              </a:fillRef>
+              <a:effectRef idx="0">
+                <a:schemeClr val="accent1"/>
+              </a:effectRef>
+              <a:fontRef idx="minor">
+                <a:schemeClr val="tx1"/>
+              </a:fontRef>
+            </p:style>
+          </p:cxnSp>
+          <p:cxnSp>
+            <p:nvCxnSpPr>
+              <p:cNvPr id="29" name="Straight Connector 28"/>
+              <p:cNvCxnSpPr/>
+              <p:nvPr/>
+            </p:nvCxnSpPr>
+            <p:spPr>
+              <a:xfrm>
+                <a:off x="11106150" y="2952750"/>
+                <a:ext cx="238125" cy="276225"/>
+              </a:xfrm>
+              <a:prstGeom prst="line">
+                <a:avLst/>
+              </a:prstGeom>
+              <a:grpFill/>
+              <a:ln w="38100">
+                <a:solidFill>
+                  <a:srgbClr val="00B050"/>
+                </a:solidFill>
+              </a:ln>
+            </p:spPr>
+            <p:style>
+              <a:lnRef idx="1">
+                <a:schemeClr val="accent1"/>
+              </a:lnRef>
+              <a:fillRef idx="0">
+                <a:schemeClr val="accent1"/>
+              </a:fillRef>
+              <a:effectRef idx="0">
+                <a:schemeClr val="accent1"/>
+              </a:effectRef>
+              <a:fontRef idx="minor">
+                <a:schemeClr val="tx1"/>
+              </a:fontRef>
+            </p:style>
+          </p:cxnSp>
+          <p:cxnSp>
+            <p:nvCxnSpPr>
+              <p:cNvPr id="30" name="Straight Connector 29"/>
+              <p:cNvCxnSpPr/>
+              <p:nvPr/>
+            </p:nvCxnSpPr>
+            <p:spPr>
+              <a:xfrm>
+                <a:off x="10883527" y="2625633"/>
+                <a:ext cx="460748" cy="0"/>
+              </a:xfrm>
+              <a:prstGeom prst="line">
+                <a:avLst/>
+              </a:prstGeom>
+              <a:grpFill/>
+              <a:ln w="38100">
+                <a:solidFill>
+                  <a:srgbClr val="00B050"/>
+                </a:solidFill>
+              </a:ln>
+            </p:spPr>
+            <p:style>
+              <a:lnRef idx="1">
+                <a:schemeClr val="accent1"/>
+              </a:lnRef>
+              <a:fillRef idx="0">
+                <a:schemeClr val="accent1"/>
+              </a:fillRef>
+              <a:effectRef idx="0">
+                <a:schemeClr val="accent1"/>
+              </a:effectRef>
+              <a:fontRef idx="minor">
+                <a:schemeClr val="tx1"/>
+              </a:fontRef>
+            </p:style>
+          </p:cxnSp>
+        </p:grpSp>
+        <p:sp>
+          <p:nvSpPr>
+            <p:cNvPr id="31" name="TextBox 30"/>
+            <p:cNvSpPr txBox="1"/>
+            <p:nvPr/>
+          </p:nvSpPr>
+          <p:spPr>
+            <a:xfrm>
+              <a:off x="9319286" y="3900375"/>
+              <a:ext cx="1713931" cy="430887"/>
+            </a:xfrm>
+            <a:prstGeom prst="rect">
+              <a:avLst/>
+            </a:prstGeom>
+            <a:noFill/>
+          </p:spPr>
+          <p:txBody>
+            <a:bodyPr wrap="none" rtlCol="0">
+              <a:spAutoFit/>
+            </a:bodyPr>
+            <a:lstStyle/>
+            <a:p>
+              <a:r>
+                <a:rPr lang="en-US" sz="1100" dirty="0" smtClean="0"/>
+                <a:t>Requirement Implementer</a:t>
+              </a:r>
+            </a:p>
+            <a:p>
+              <a:r>
+                <a:rPr lang="en-US" sz="1100" dirty="0" smtClean="0"/>
+                <a:t>( Developer)</a:t>
+              </a:r>
+              <a:endParaRPr lang="en-US" sz="1100" dirty="0"/>
+            </a:p>
+          </p:txBody>
+        </p:sp>
+      </p:grpSp>
+      <p:grpSp>
+        <p:nvGrpSpPr>
+          <p:cNvPr id="39" name="Group 38"/>
+          <p:cNvGrpSpPr/>
+          <p:nvPr/>
+        </p:nvGrpSpPr>
+        <p:grpSpPr>
+          <a:xfrm>
+            <a:off x="9264522" y="724857"/>
+            <a:ext cx="704039" cy="885331"/>
+            <a:chOff x="0" y="3697319"/>
+            <a:chExt cx="704039" cy="885331"/>
+          </a:xfrm>
+        </p:grpSpPr>
+        <p:grpSp>
+          <p:nvGrpSpPr>
+            <p:cNvPr id="32" name="Group 31"/>
+            <p:cNvGrpSpPr/>
+            <p:nvPr/>
+          </p:nvGrpSpPr>
+          <p:grpSpPr>
+            <a:xfrm>
+              <a:off x="311461" y="3697319"/>
+              <a:ext cx="298823" cy="526596"/>
+              <a:chOff x="10883527" y="2257425"/>
+              <a:chExt cx="460748" cy="1040946"/>
+            </a:xfrm>
+            <a:solidFill>
+              <a:srgbClr val="FF0000"/>
+            </a:solidFill>
+          </p:grpSpPr>
+          <p:cxnSp>
+            <p:nvCxnSpPr>
+              <p:cNvPr id="33" name="Straight Connector 32"/>
+              <p:cNvCxnSpPr>
+                <a:stCxn id="34" idx="4"/>
+              </p:cNvCxnSpPr>
+              <p:nvPr/>
+            </p:nvCxnSpPr>
+            <p:spPr>
+              <a:xfrm>
+                <a:off x="11087100" y="2466975"/>
+                <a:ext cx="19050" cy="485775"/>
+              </a:xfrm>
+              <a:prstGeom prst="line">
+                <a:avLst/>
+              </a:prstGeom>
+              <a:grpFill/>
+              <a:ln w="38100">
+                <a:solidFill>
+                  <a:srgbClr val="FF0000"/>
+                </a:solidFill>
+              </a:ln>
+            </p:spPr>
+            <p:style>
+              <a:lnRef idx="1">
+                <a:schemeClr val="accent1"/>
+              </a:lnRef>
+              <a:fillRef idx="0">
+                <a:schemeClr val="accent1"/>
+              </a:fillRef>
+              <a:effectRef idx="0">
+                <a:schemeClr val="accent1"/>
+              </a:effectRef>
+              <a:fontRef idx="minor">
+                <a:schemeClr val="tx1"/>
+              </a:fontRef>
+            </p:style>
+          </p:cxnSp>
+          <p:sp>
+            <p:nvSpPr>
+              <p:cNvPr id="34" name="Oval 33"/>
+              <p:cNvSpPr/>
+              <p:nvPr/>
+            </p:nvSpPr>
+            <p:spPr>
+              <a:xfrm>
+                <a:off x="10991850" y="2257425"/>
+                <a:ext cx="190500" cy="209550"/>
+              </a:xfrm>
+              <a:prstGeom prst="ellipse">
+                <a:avLst/>
+              </a:prstGeom>
+              <a:grpFill/>
+              <a:ln>
+                <a:solidFill>
+                  <a:srgbClr val="FF0000"/>
+                </a:solidFill>
+              </a:ln>
+            </p:spPr>
+            <p:style>
+              <a:lnRef idx="2">
+                <a:schemeClr val="accent1">
+                  <a:shade val="50000"/>
+                </a:schemeClr>
+              </a:lnRef>
+              <a:fillRef idx="1">
+                <a:schemeClr val="accent1"/>
+              </a:fillRef>
+              <a:effectRef idx="0">
+                <a:schemeClr val="accent1"/>
+              </a:effectRef>
+              <a:fontRef idx="minor">
+                <a:schemeClr val="lt1"/>
+              </a:fontRef>
+            </p:style>
+            <p:txBody>
+              <a:bodyPr rtlCol="0" anchor="ctr"/>
+              <a:lstStyle/>
+              <a:p>
+                <a:pPr algn="ctr"/>
+                <a:endParaRPr lang="en-US"/>
+              </a:p>
+            </p:txBody>
+          </p:sp>
+          <p:cxnSp>
+            <p:nvCxnSpPr>
+              <p:cNvPr id="35" name="Straight Connector 34"/>
+              <p:cNvCxnSpPr/>
+              <p:nvPr/>
+            </p:nvCxnSpPr>
+            <p:spPr>
+              <a:xfrm flipH="1">
+                <a:off x="10972800" y="2952750"/>
+                <a:ext cx="123825" cy="345621"/>
+              </a:xfrm>
+              <a:prstGeom prst="line">
+                <a:avLst/>
+              </a:prstGeom>
+              <a:grpFill/>
+              <a:ln w="38100">
+                <a:solidFill>
+                  <a:srgbClr val="FF0000"/>
+                </a:solidFill>
+              </a:ln>
+            </p:spPr>
+            <p:style>
+              <a:lnRef idx="1">
+                <a:schemeClr val="accent1"/>
+              </a:lnRef>
+              <a:fillRef idx="0">
+                <a:schemeClr val="accent1"/>
+              </a:fillRef>
+              <a:effectRef idx="0">
+                <a:schemeClr val="accent1"/>
+              </a:effectRef>
+              <a:fontRef idx="minor">
+                <a:schemeClr val="tx1"/>
+              </a:fontRef>
+            </p:style>
+          </p:cxnSp>
+          <p:cxnSp>
+            <p:nvCxnSpPr>
+              <p:cNvPr id="36" name="Straight Connector 35"/>
+              <p:cNvCxnSpPr/>
+              <p:nvPr/>
+            </p:nvCxnSpPr>
+            <p:spPr>
+              <a:xfrm>
+                <a:off x="11106150" y="2952750"/>
+                <a:ext cx="238125" cy="276225"/>
+              </a:xfrm>
+              <a:prstGeom prst="line">
+                <a:avLst/>
+              </a:prstGeom>
+              <a:grpFill/>
+              <a:ln w="38100">
+                <a:solidFill>
+                  <a:srgbClr val="FF0000"/>
+                </a:solidFill>
+              </a:ln>
+            </p:spPr>
+            <p:style>
+              <a:lnRef idx="1">
+                <a:schemeClr val="accent1"/>
+              </a:lnRef>
+              <a:fillRef idx="0">
+                <a:schemeClr val="accent1"/>
+              </a:fillRef>
+              <a:effectRef idx="0">
+                <a:schemeClr val="accent1"/>
+              </a:effectRef>
+              <a:fontRef idx="minor">
+                <a:schemeClr val="tx1"/>
+              </a:fontRef>
+            </p:style>
+          </p:cxnSp>
+          <p:cxnSp>
+            <p:nvCxnSpPr>
+              <p:cNvPr id="37" name="Straight Connector 36"/>
+              <p:cNvCxnSpPr/>
+              <p:nvPr/>
+            </p:nvCxnSpPr>
+            <p:spPr>
+              <a:xfrm>
+                <a:off x="10883527" y="2625633"/>
+                <a:ext cx="460748" cy="0"/>
+              </a:xfrm>
+              <a:prstGeom prst="line">
+                <a:avLst/>
+              </a:prstGeom>
+              <a:grpFill/>
+              <a:ln w="38100">
+                <a:solidFill>
+                  <a:srgbClr val="FF0000"/>
+                </a:solidFill>
+              </a:ln>
+            </p:spPr>
+            <p:style>
+              <a:lnRef idx="1">
+                <a:schemeClr val="accent1"/>
+              </a:lnRef>
+              <a:fillRef idx="0">
+                <a:schemeClr val="accent1"/>
+              </a:fillRef>
+              <a:effectRef idx="0">
+                <a:schemeClr val="accent1"/>
+              </a:effectRef>
+              <a:fontRef idx="minor">
+                <a:schemeClr val="tx1"/>
+              </a:fontRef>
+            </p:style>
+          </p:cxnSp>
+        </p:grpSp>
+        <p:sp>
+          <p:nvSpPr>
+            <p:cNvPr id="38" name="TextBox 37"/>
+            <p:cNvSpPr txBox="1"/>
+            <p:nvPr/>
+          </p:nvSpPr>
+          <p:spPr>
+            <a:xfrm>
+              <a:off x="0" y="4321040"/>
+              <a:ext cx="704039" cy="261610"/>
+            </a:xfrm>
+            <a:prstGeom prst="rect">
+              <a:avLst/>
+            </a:prstGeom>
+            <a:noFill/>
+          </p:spPr>
+          <p:txBody>
+            <a:bodyPr wrap="none" rtlCol="0">
+              <a:spAutoFit/>
+            </a:bodyPr>
+            <a:lstStyle/>
+            <a:p>
+              <a:r>
+                <a:rPr lang="en-US" sz="1100" dirty="0" smtClean="0"/>
+                <a:t>Architect</a:t>
+              </a:r>
+              <a:endParaRPr lang="en-US" sz="1100" dirty="0"/>
+            </a:p>
+          </p:txBody>
+        </p:sp>
+      </p:grpSp>
+      <p:grpSp>
+        <p:nvGrpSpPr>
+          <p:cNvPr id="42" name="Group 41"/>
+          <p:cNvGrpSpPr/>
+          <p:nvPr/>
+        </p:nvGrpSpPr>
+        <p:grpSpPr>
+          <a:xfrm>
+            <a:off x="310085" y="3288799"/>
+            <a:ext cx="675185" cy="911956"/>
+            <a:chOff x="9614780" y="1460530"/>
+            <a:chExt cx="675185" cy="911956"/>
+          </a:xfrm>
+        </p:grpSpPr>
+        <p:grpSp>
+          <p:nvGrpSpPr>
+            <p:cNvPr id="43" name="Group 42"/>
+            <p:cNvGrpSpPr/>
+            <p:nvPr/>
+          </p:nvGrpSpPr>
+          <p:grpSpPr>
+            <a:xfrm>
+              <a:off x="9890133" y="1460530"/>
+              <a:ext cx="298823" cy="526596"/>
+              <a:chOff x="10883527" y="2257425"/>
+              <a:chExt cx="460748" cy="1040946"/>
+            </a:xfrm>
+            <a:solidFill>
+              <a:srgbClr val="7030A0"/>
+            </a:solidFill>
+          </p:grpSpPr>
+          <p:cxnSp>
+            <p:nvCxnSpPr>
+              <p:cNvPr id="45" name="Straight Connector 44"/>
+              <p:cNvCxnSpPr>
+                <a:stCxn id="46" idx="4"/>
+              </p:cNvCxnSpPr>
+              <p:nvPr/>
+            </p:nvCxnSpPr>
+            <p:spPr>
+              <a:xfrm>
+                <a:off x="11087100" y="2466975"/>
+                <a:ext cx="19050" cy="485775"/>
+              </a:xfrm>
+              <a:prstGeom prst="line">
+                <a:avLst/>
+              </a:prstGeom>
+              <a:grpFill/>
+              <a:ln w="38100">
+                <a:solidFill>
+                  <a:srgbClr val="C00000"/>
+                </a:solidFill>
+              </a:ln>
+            </p:spPr>
+            <p:style>
+              <a:lnRef idx="1">
+                <a:schemeClr val="accent1"/>
+              </a:lnRef>
+              <a:fillRef idx="0">
+                <a:schemeClr val="accent1"/>
+              </a:fillRef>
+              <a:effectRef idx="0">
+                <a:schemeClr val="accent1"/>
+              </a:effectRef>
+              <a:fontRef idx="minor">
+                <a:schemeClr val="tx1"/>
+              </a:fontRef>
+            </p:style>
+          </p:cxnSp>
+          <p:sp>
+            <p:nvSpPr>
+              <p:cNvPr id="46" name="Oval 45"/>
+              <p:cNvSpPr/>
+              <p:nvPr/>
+            </p:nvSpPr>
+            <p:spPr>
+              <a:xfrm>
+                <a:off x="10991850" y="2257425"/>
+                <a:ext cx="190500" cy="209550"/>
+              </a:xfrm>
+              <a:prstGeom prst="ellipse">
+                <a:avLst/>
+              </a:prstGeom>
+              <a:grpFill/>
+              <a:ln>
+                <a:solidFill>
+                  <a:srgbClr val="C00000"/>
+                </a:solidFill>
+              </a:ln>
+            </p:spPr>
+            <p:style>
+              <a:lnRef idx="2">
+                <a:schemeClr val="accent1">
+                  <a:shade val="50000"/>
+                </a:schemeClr>
+              </a:lnRef>
+              <a:fillRef idx="1">
+                <a:schemeClr val="accent1"/>
+              </a:fillRef>
+              <a:effectRef idx="0">
+                <a:schemeClr val="accent1"/>
+              </a:effectRef>
+              <a:fontRef idx="minor">
+                <a:schemeClr val="lt1"/>
+              </a:fontRef>
+            </p:style>
+            <p:txBody>
+              <a:bodyPr rtlCol="0" anchor="ctr"/>
+              <a:lstStyle/>
+              <a:p>
+                <a:pPr algn="ctr"/>
+                <a:endParaRPr lang="en-US"/>
+              </a:p>
+            </p:txBody>
+          </p:sp>
+          <p:cxnSp>
+            <p:nvCxnSpPr>
+              <p:cNvPr id="47" name="Straight Connector 46"/>
+              <p:cNvCxnSpPr/>
+              <p:nvPr/>
+            </p:nvCxnSpPr>
+            <p:spPr>
+              <a:xfrm flipH="1">
+                <a:off x="10972800" y="2952750"/>
+                <a:ext cx="123825" cy="345621"/>
+              </a:xfrm>
+              <a:prstGeom prst="line">
+                <a:avLst/>
+              </a:prstGeom>
+              <a:grpFill/>
+              <a:ln w="38100">
+                <a:solidFill>
+                  <a:srgbClr val="C00000"/>
+                </a:solidFill>
+              </a:ln>
+            </p:spPr>
+            <p:style>
+              <a:lnRef idx="1">
+                <a:schemeClr val="accent1"/>
+              </a:lnRef>
+              <a:fillRef idx="0">
+                <a:schemeClr val="accent1"/>
+              </a:fillRef>
+              <a:effectRef idx="0">
+                <a:schemeClr val="accent1"/>
+              </a:effectRef>
+              <a:fontRef idx="minor">
+                <a:schemeClr val="tx1"/>
+              </a:fontRef>
+            </p:style>
+          </p:cxnSp>
+          <p:cxnSp>
+            <p:nvCxnSpPr>
+              <p:cNvPr id="48" name="Straight Connector 47"/>
+              <p:cNvCxnSpPr/>
+              <p:nvPr/>
+            </p:nvCxnSpPr>
+            <p:spPr>
+              <a:xfrm>
+                <a:off x="11106150" y="2952750"/>
+                <a:ext cx="238125" cy="276225"/>
+              </a:xfrm>
+              <a:prstGeom prst="line">
+                <a:avLst/>
+              </a:prstGeom>
+              <a:grpFill/>
+              <a:ln w="38100">
+                <a:solidFill>
+                  <a:srgbClr val="C00000"/>
+                </a:solidFill>
+              </a:ln>
+            </p:spPr>
+            <p:style>
+              <a:lnRef idx="1">
+                <a:schemeClr val="accent1"/>
+              </a:lnRef>
+              <a:fillRef idx="0">
+                <a:schemeClr val="accent1"/>
+              </a:fillRef>
+              <a:effectRef idx="0">
+                <a:schemeClr val="accent1"/>
+              </a:effectRef>
+              <a:fontRef idx="minor">
+                <a:schemeClr val="tx1"/>
+              </a:fontRef>
+            </p:style>
+          </p:cxnSp>
+          <p:cxnSp>
+            <p:nvCxnSpPr>
+              <p:cNvPr id="49" name="Straight Connector 48"/>
+              <p:cNvCxnSpPr/>
+              <p:nvPr/>
+            </p:nvCxnSpPr>
+            <p:spPr>
+              <a:xfrm>
+                <a:off x="10883527" y="2625633"/>
+                <a:ext cx="460748" cy="0"/>
+              </a:xfrm>
+              <a:prstGeom prst="line">
+                <a:avLst/>
+              </a:prstGeom>
+              <a:grpFill/>
+              <a:ln w="38100">
+                <a:solidFill>
+                  <a:srgbClr val="C00000"/>
+                </a:solidFill>
+              </a:ln>
+            </p:spPr>
+            <p:style>
+              <a:lnRef idx="1">
+                <a:schemeClr val="accent1"/>
+              </a:lnRef>
+              <a:fillRef idx="0">
+                <a:schemeClr val="accent1"/>
+              </a:fillRef>
+              <a:effectRef idx="0">
+                <a:schemeClr val="accent1"/>
+              </a:effectRef>
+              <a:fontRef idx="minor">
+                <a:schemeClr val="tx1"/>
+              </a:fontRef>
+            </p:style>
+          </p:cxnSp>
+        </p:grpSp>
+        <p:sp>
+          <p:nvSpPr>
+            <p:cNvPr id="44" name="TextBox 43"/>
+            <p:cNvSpPr txBox="1"/>
+            <p:nvPr/>
+          </p:nvSpPr>
+          <p:spPr>
+            <a:xfrm>
+              <a:off x="9614780" y="2110876"/>
+              <a:ext cx="675185" cy="261610"/>
+            </a:xfrm>
+            <a:prstGeom prst="rect">
+              <a:avLst/>
+            </a:prstGeom>
+            <a:noFill/>
+          </p:spPr>
+          <p:txBody>
+            <a:bodyPr wrap="none" rtlCol="0">
+              <a:spAutoFit/>
+            </a:bodyPr>
+            <a:lstStyle/>
+            <a:p>
+              <a:r>
+                <a:rPr lang="en-US" sz="1100" dirty="0" smtClean="0"/>
+                <a:t>Financer</a:t>
+              </a:r>
+              <a:endParaRPr lang="en-US" sz="1100" dirty="0"/>
+            </a:p>
+          </p:txBody>
+        </p:sp>
+      </p:grpSp>
     </p:spTree>
     <p:extLst>
       <p:ext uri="{BB962C8B-B14F-4D97-AF65-F5344CB8AC3E}">
@@ -3475,6 +4709,12 @@
           <a:prstGeom prst="chevron">
             <a:avLst/>
           </a:prstGeom>
+          <a:solidFill>
+            <a:schemeClr val="accent6">
+              <a:lumMod val="60000"/>
+              <a:lumOff val="40000"/>
+            </a:schemeClr>
+          </a:solidFill>
         </p:spPr>
         <p:style>
           <a:lnRef idx="2">
@@ -3523,6 +4763,64 @@
           <a:xfrm>
             <a:off x="1104900" y="2994027"/>
             <a:ext cx="2641600" cy="963612"/>
+          </a:xfrm>
+          <a:prstGeom prst="chevron">
+            <a:avLst/>
+          </a:prstGeom>
+          <a:solidFill>
+            <a:schemeClr val="accent6">
+              <a:lumMod val="60000"/>
+              <a:lumOff val="40000"/>
+            </a:schemeClr>
+          </a:solidFill>
+        </p:spPr>
+        <p:style>
+          <a:lnRef idx="2">
+            <a:schemeClr val="accent1">
+              <a:shade val="50000"/>
+            </a:schemeClr>
+          </a:lnRef>
+          <a:fillRef idx="1">
+            <a:schemeClr val="accent1"/>
+          </a:fillRef>
+          <a:effectRef idx="0">
+            <a:schemeClr val="accent1"/>
+          </a:effectRef>
+          <a:fontRef idx="minor">
+            <a:schemeClr val="lt1"/>
+          </a:fontRef>
+        </p:style>
+        <p:txBody>
+          <a:bodyPr rtlCol="0" anchor="ctr"/>
+          <a:lstStyle/>
+          <a:p>
+            <a:pPr algn="ctr"/>
+            <a:r>
+              <a:rPr lang="en-US" dirty="0">
+                <a:solidFill>
+                  <a:schemeClr val="tx1"/>
+                </a:solidFill>
+              </a:rPr>
+              <a:t>Manageability</a:t>
+            </a:r>
+            <a:endParaRPr lang="en-US" dirty="0">
+              <a:solidFill>
+                <a:schemeClr val="tx1"/>
+              </a:solidFill>
+            </a:endParaRPr>
+          </a:p>
+        </p:txBody>
+      </p:sp>
+      <p:sp>
+        <p:nvSpPr>
+          <p:cNvPr id="9" name="Chevron 8"/>
+          <p:cNvSpPr/>
+          <p:nvPr/>
+        </p:nvSpPr>
+        <p:spPr>
+          <a:xfrm>
+            <a:off x="3479800" y="2979742"/>
+            <a:ext cx="2752188" cy="963612"/>
           </a:xfrm>
           <a:prstGeom prst="chevron">
             <a:avLst/>
@@ -3550,12 +4848,12 @@
           <a:p>
             <a:pPr algn="ctr"/>
             <a:r>
-              <a:rPr lang="en-US" dirty="0" smtClean="0">
+              <a:rPr lang="en-US" dirty="0" err="1" smtClean="0">
                 <a:solidFill>
                   <a:schemeClr val="tx1"/>
                 </a:solidFill>
               </a:rPr>
-              <a:t>Manageability</a:t>
+              <a:t>Extensionalbility</a:t>
             </a:r>
             <a:endParaRPr lang="en-US" dirty="0">
               <a:solidFill>
@@ -3567,13 +4865,13 @@
       </p:sp>
       <p:sp>
         <p:nvSpPr>
-          <p:cNvPr id="9" name="Chevron 8"/>
+          <p:cNvPr id="10" name="Chevron 9"/>
           <p:cNvSpPr/>
           <p:nvPr/>
         </p:nvSpPr>
         <p:spPr>
           <a:xfrm>
-            <a:off x="3479800" y="2979742"/>
+            <a:off x="5994400" y="2971805"/>
             <a:ext cx="2641600" cy="963612"/>
           </a:xfrm>
           <a:prstGeom prst="chevron">
@@ -3602,12 +4900,12 @@
           <a:p>
             <a:pPr algn="ctr"/>
             <a:r>
-              <a:rPr lang="en-US" dirty="0" err="1" smtClean="0">
+              <a:rPr lang="en-US" dirty="0" smtClean="0">
                 <a:solidFill>
                   <a:schemeClr val="tx1"/>
                 </a:solidFill>
               </a:rPr>
-              <a:t>Extentionability</a:t>
+              <a:t>Reusability</a:t>
             </a:r>
             <a:endParaRPr lang="en-US" dirty="0">
               <a:solidFill>
@@ -3619,13 +4917,13 @@
       </p:sp>
       <p:sp>
         <p:nvSpPr>
-          <p:cNvPr id="10" name="Chevron 9"/>
+          <p:cNvPr id="11" name="Chevron 10"/>
           <p:cNvSpPr/>
           <p:nvPr/>
         </p:nvSpPr>
         <p:spPr>
           <a:xfrm>
-            <a:off x="5994400" y="2971805"/>
+            <a:off x="8369300" y="2963868"/>
             <a:ext cx="2641600" cy="963612"/>
           </a:xfrm>
           <a:prstGeom prst="chevron">
@@ -3659,7 +4957,7 @@
                   <a:schemeClr val="tx1"/>
                 </a:solidFill>
               </a:rPr>
-              <a:t>Reusability</a:t>
+              <a:t>Interoperability</a:t>
             </a:r>
             <a:endParaRPr lang="en-US" dirty="0">
               <a:solidFill>
@@ -3671,18 +4969,31 @@
       </p:sp>
       <p:sp>
         <p:nvSpPr>
-          <p:cNvPr id="11" name="Chevron 10"/>
+          <p:cNvPr id="12" name="Chevron 11"/>
           <p:cNvSpPr/>
           <p:nvPr/>
         </p:nvSpPr>
         <p:spPr>
           <a:xfrm>
-            <a:off x="8445500" y="3016251"/>
+            <a:off x="2641600" y="4622715"/>
             <a:ext cx="2641600" cy="963612"/>
           </a:xfrm>
           <a:prstGeom prst="chevron">
             <a:avLst/>
           </a:prstGeom>
+          <a:solidFill>
+            <a:schemeClr val="accent6">
+              <a:lumMod val="75000"/>
+            </a:schemeClr>
+          </a:solidFill>
+          <a:ln>
+            <a:solidFill>
+              <a:schemeClr val="accent6">
+                <a:lumMod val="60000"/>
+                <a:lumOff val="40000"/>
+              </a:schemeClr>
+            </a:solidFill>
+          </a:ln>
         </p:spPr>
         <p:style>
           <a:lnRef idx="2">
@@ -3711,7 +5022,15 @@
                   <a:schemeClr val="tx1"/>
                 </a:solidFill>
               </a:rPr>
-              <a:t>Interoperability</a:t>
+              <a:t>Reliability/ </a:t>
+            </a:r>
+            <a:r>
+              <a:rPr lang="en-US" dirty="0" err="1" smtClean="0">
+                <a:solidFill>
+                  <a:schemeClr val="tx1"/>
+                </a:solidFill>
+              </a:rPr>
+              <a:t>Trustability</a:t>
             </a:r>
             <a:endParaRPr lang="en-US" dirty="0">
               <a:solidFill>
@@ -3723,18 +5042,31 @@
       </p:sp>
       <p:sp>
         <p:nvSpPr>
-          <p:cNvPr id="12" name="Chevron 11"/>
+          <p:cNvPr id="13" name="Chevron 12"/>
           <p:cNvSpPr/>
           <p:nvPr/>
         </p:nvSpPr>
         <p:spPr>
           <a:xfrm>
-            <a:off x="1104900" y="3968751"/>
+            <a:off x="2641600" y="5614875"/>
             <a:ext cx="2641600" cy="963612"/>
           </a:xfrm>
           <a:prstGeom prst="chevron">
             <a:avLst/>
           </a:prstGeom>
+          <a:solidFill>
+            <a:schemeClr val="accent6">
+              <a:lumMod val="75000"/>
+            </a:schemeClr>
+          </a:solidFill>
+          <a:ln>
+            <a:solidFill>
+              <a:schemeClr val="accent6">
+                <a:lumMod val="60000"/>
+                <a:lumOff val="40000"/>
+              </a:schemeClr>
+            </a:solidFill>
+          </a:ln>
         </p:spPr>
         <p:style>
           <a:lnRef idx="2">
@@ -3763,7 +5095,7 @@
                   <a:schemeClr val="tx1"/>
                 </a:solidFill>
               </a:rPr>
-              <a:t>Reliability</a:t>
+              <a:t>Easy Use ( End user)</a:t>
             </a:r>
             <a:endParaRPr lang="en-US" dirty="0">
               <a:solidFill>
@@ -3775,18 +5107,31 @@
       </p:sp>
       <p:sp>
         <p:nvSpPr>
-          <p:cNvPr id="13" name="Chevron 12"/>
+          <p:cNvPr id="14" name="Chevron 13"/>
           <p:cNvSpPr/>
           <p:nvPr/>
         </p:nvSpPr>
         <p:spPr>
           <a:xfrm>
-            <a:off x="1104900" y="5070475"/>
+            <a:off x="0" y="4662375"/>
             <a:ext cx="2641600" cy="963612"/>
           </a:xfrm>
           <a:prstGeom prst="chevron">
             <a:avLst/>
           </a:prstGeom>
+          <a:solidFill>
+            <a:schemeClr val="accent6">
+              <a:lumMod val="75000"/>
+            </a:schemeClr>
+          </a:solidFill>
+          <a:ln>
+            <a:solidFill>
+              <a:schemeClr val="accent6">
+                <a:lumMod val="60000"/>
+                <a:lumOff val="40000"/>
+              </a:schemeClr>
+            </a:solidFill>
+          </a:ln>
         </p:spPr>
         <p:style>
           <a:lnRef idx="2">
@@ -3815,7 +5160,7 @@
                   <a:schemeClr val="tx1"/>
                 </a:solidFill>
               </a:rPr>
-              <a:t>Easy Use ( End user)</a:t>
+              <a:t>Time to Market</a:t>
             </a:r>
             <a:endParaRPr lang="en-US" dirty="0">
               <a:solidFill>
@@ -3827,18 +5172,30 @@
       </p:sp>
       <p:sp>
         <p:nvSpPr>
-          <p:cNvPr id="14" name="Chevron 13"/>
+          <p:cNvPr id="15" name="Chevron 14"/>
           <p:cNvSpPr/>
           <p:nvPr/>
         </p:nvSpPr>
         <p:spPr>
           <a:xfrm>
-            <a:off x="4483100" y="5070475"/>
+            <a:off x="0" y="5643423"/>
             <a:ext cx="2641600" cy="963612"/>
           </a:xfrm>
           <a:prstGeom prst="chevron">
             <a:avLst/>
           </a:prstGeom>
+          <a:solidFill>
+            <a:schemeClr val="accent6">
+              <a:lumMod val="50000"/>
+            </a:schemeClr>
+          </a:solidFill>
+          <a:ln>
+            <a:solidFill>
+              <a:schemeClr val="accent6">
+                <a:lumMod val="50000"/>
+              </a:schemeClr>
+            </a:solidFill>
+          </a:ln>
         </p:spPr>
         <p:style>
           <a:lnRef idx="2">
@@ -3867,7 +5224,7 @@
                   <a:schemeClr val="tx1"/>
                 </a:solidFill>
               </a:rPr>
-              <a:t>Time to Market</a:t>
+              <a:t>Budget</a:t>
             </a:r>
             <a:endParaRPr lang="en-US" dirty="0">
               <a:solidFill>
@@ -3909,22 +5266,83 @@
       </p:grpSpPr>
       <p:sp>
         <p:nvSpPr>
-          <p:cNvPr id="33" name="Rectangle 32"/>
+          <p:cNvPr id="81" name="Rectangle 80"/>
           <p:cNvSpPr/>
           <p:nvPr/>
         </p:nvSpPr>
         <p:spPr>
           <a:xfrm>
-            <a:off x="3344092" y="3386899"/>
-            <a:ext cx="1745532" cy="1063794"/>
+            <a:off x="41855" y="5693695"/>
+            <a:ext cx="11025567" cy="1185372"/>
           </a:xfrm>
           <a:prstGeom prst="rect">
             <a:avLst/>
           </a:prstGeom>
           <a:solidFill>
-            <a:schemeClr val="accent5">
-              <a:lumMod val="20000"/>
-              <a:lumOff val="80000"/>
+            <a:srgbClr val="FF0000">
+              <a:alpha val="26000"/>
+            </a:srgbClr>
+          </a:solidFill>
+        </p:spPr>
+        <p:style>
+          <a:lnRef idx="2">
+            <a:schemeClr val="accent1">
+              <a:shade val="50000"/>
+            </a:schemeClr>
+          </a:lnRef>
+          <a:fillRef idx="1">
+            <a:schemeClr val="accent1"/>
+          </a:fillRef>
+          <a:effectRef idx="0">
+            <a:schemeClr val="accent1"/>
+          </a:effectRef>
+          <a:fontRef idx="minor">
+            <a:schemeClr val="lt1"/>
+          </a:fontRef>
+        </p:style>
+        <p:txBody>
+          <a:bodyPr rtlCol="0" anchor="b"/>
+          <a:lstStyle/>
+          <a:p>
+            <a:r>
+              <a:rPr lang="en-US" dirty="0" smtClean="0">
+                <a:solidFill>
+                  <a:schemeClr val="accent6">
+                    <a:lumMod val="50000"/>
+                  </a:schemeClr>
+                </a:solidFill>
+              </a:rPr>
+              <a:t>Phase 3 : Support</a:t>
+            </a:r>
+            <a:endParaRPr lang="en-US" dirty="0">
+              <a:solidFill>
+                <a:schemeClr val="accent6">
+                  <a:lumMod val="50000"/>
+                </a:schemeClr>
+              </a:solidFill>
+            </a:endParaRPr>
+          </a:p>
+        </p:txBody>
+      </p:sp>
+      <p:sp>
+        <p:nvSpPr>
+          <p:cNvPr id="3" name="Rectangle 2"/>
+          <p:cNvSpPr/>
+          <p:nvPr/>
+        </p:nvSpPr>
+        <p:spPr>
+          <a:xfrm>
+            <a:off x="41855" y="2548314"/>
+            <a:ext cx="11025567" cy="3040509"/>
+          </a:xfrm>
+          <a:prstGeom prst="rect">
+            <a:avLst/>
+          </a:prstGeom>
+          <a:solidFill>
+            <a:schemeClr val="accent2">
+              <a:lumMod val="60000"/>
+              <a:lumOff val="40000"/>
+              <a:alpha val="26000"/>
             </a:schemeClr>
           </a:solidFill>
         </p:spPr>
@@ -3945,6 +5363,135 @@
           </a:fontRef>
         </p:style>
         <p:txBody>
+          <a:bodyPr rtlCol="0" anchor="b"/>
+          <a:lstStyle/>
+          <a:p>
+            <a:r>
+              <a:rPr lang="en-US" dirty="0" smtClean="0">
+                <a:solidFill>
+                  <a:schemeClr val="accent6">
+                    <a:lumMod val="50000"/>
+                  </a:schemeClr>
+                </a:solidFill>
+              </a:rPr>
+              <a:t>Phase 2: Development</a:t>
+            </a:r>
+            <a:endParaRPr lang="en-US" dirty="0">
+              <a:solidFill>
+                <a:schemeClr val="accent6">
+                  <a:lumMod val="50000"/>
+                </a:schemeClr>
+              </a:solidFill>
+            </a:endParaRPr>
+          </a:p>
+        </p:txBody>
+      </p:sp>
+      <p:sp>
+        <p:nvSpPr>
+          <p:cNvPr id="79" name="Rectangle 78"/>
+          <p:cNvSpPr/>
+          <p:nvPr/>
+        </p:nvSpPr>
+        <p:spPr>
+          <a:xfrm>
+            <a:off x="41855" y="927915"/>
+            <a:ext cx="11025567" cy="1678357"/>
+          </a:xfrm>
+          <a:prstGeom prst="rect">
+            <a:avLst/>
+          </a:prstGeom>
+          <a:solidFill>
+            <a:schemeClr val="accent1">
+              <a:lumMod val="40000"/>
+              <a:lumOff val="60000"/>
+              <a:alpha val="26000"/>
+            </a:schemeClr>
+          </a:solidFill>
+        </p:spPr>
+        <p:style>
+          <a:lnRef idx="2">
+            <a:schemeClr val="accent1">
+              <a:shade val="50000"/>
+            </a:schemeClr>
+          </a:lnRef>
+          <a:fillRef idx="1">
+            <a:schemeClr val="accent1"/>
+          </a:fillRef>
+          <a:effectRef idx="0">
+            <a:schemeClr val="accent1"/>
+          </a:effectRef>
+          <a:fontRef idx="minor">
+            <a:schemeClr val="lt1"/>
+          </a:fontRef>
+        </p:style>
+        <p:txBody>
+          <a:bodyPr rtlCol="0" anchor="t"/>
+          <a:lstStyle/>
+          <a:p>
+            <a:pPr algn="ctr"/>
+            <a:r>
+              <a:rPr lang="en-US" dirty="0" smtClean="0">
+                <a:solidFill>
+                  <a:schemeClr val="accent6">
+                    <a:lumMod val="50000"/>
+                  </a:schemeClr>
+                </a:solidFill>
+              </a:rPr>
+              <a:t>Phase 1: Requirement capturing</a:t>
+            </a:r>
+            <a:endParaRPr lang="en-US" dirty="0">
+              <a:solidFill>
+                <a:schemeClr val="accent6">
+                  <a:lumMod val="50000"/>
+                </a:schemeClr>
+              </a:solidFill>
+            </a:endParaRPr>
+          </a:p>
+        </p:txBody>
+      </p:sp>
+      <p:sp>
+        <p:nvSpPr>
+          <p:cNvPr id="33" name="Rectangle 32"/>
+          <p:cNvSpPr/>
+          <p:nvPr/>
+        </p:nvSpPr>
+        <p:spPr>
+          <a:xfrm>
+            <a:off x="3344092" y="3386899"/>
+            <a:ext cx="1745532" cy="1063794"/>
+          </a:xfrm>
+          <a:prstGeom prst="rect">
+            <a:avLst/>
+          </a:prstGeom>
+          <a:solidFill>
+            <a:schemeClr val="accent5">
+              <a:lumMod val="20000"/>
+              <a:lumOff val="80000"/>
+            </a:schemeClr>
+          </a:solidFill>
+          <a:ln>
+            <a:solidFill>
+              <a:srgbClr val="FF0000"/>
+            </a:solidFill>
+          </a:ln>
+        </p:spPr>
+        <p:style>
+          <a:lnRef idx="2">
+            <a:schemeClr val="accent1">
+              <a:shade val="50000"/>
+            </a:schemeClr>
+          </a:lnRef>
+          <a:fillRef idx="1">
+            <a:schemeClr val="accent1"/>
+          </a:fillRef>
+          <a:effectRef idx="0">
+            <a:schemeClr val="accent1"/>
+          </a:effectRef>
+          <a:fontRef idx="minor">
+            <a:schemeClr val="lt1"/>
+          </a:fontRef>
+        </p:style>
+        <p:txBody>
           <a:bodyPr rtlCol="0" anchor="ctr"/>
           <a:lstStyle/>
           <a:p>
@@ -3989,12 +5536,17 @@
         </p:nvSpPr>
         <p:spPr>
           <a:xfrm>
-            <a:off x="716765" y="1179938"/>
+            <a:off x="937053" y="1506355"/>
             <a:ext cx="2272937" cy="2256036"/>
           </a:xfrm>
           <a:prstGeom prst="ellipse">
             <a:avLst/>
           </a:prstGeom>
+          <a:solidFill>
+            <a:schemeClr val="bg2">
+              <a:lumMod val="75000"/>
+            </a:schemeClr>
+          </a:solidFill>
         </p:spPr>
         <p:style>
           <a:lnRef idx="2">
@@ -4814,6 +6366,13 @@
           <a:prstGeom prst="ellipse">
             <a:avLst/>
           </a:prstGeom>
+          <a:ln w="28575">
+            <a:solidFill>
+              <a:schemeClr val="accent6">
+                <a:lumMod val="50000"/>
+              </a:schemeClr>
+            </a:solidFill>
+          </a:ln>
         </p:spPr>
         <p:style>
           <a:lnRef idx="2">
@@ -4874,6 +6433,13 @@
           <a:prstGeom prst="ellipse">
             <a:avLst/>
           </a:prstGeom>
+          <a:ln w="28575">
+            <a:solidFill>
+              <a:schemeClr val="accent6">
+                <a:lumMod val="50000"/>
+              </a:schemeClr>
+            </a:solidFill>
+          </a:ln>
         </p:spPr>
         <p:style>
           <a:lnRef idx="2">
@@ -4972,6 +6538,13 @@
           <a:prstGeom prst="ellipse">
             <a:avLst/>
           </a:prstGeom>
+          <a:ln w="28575">
+            <a:solidFill>
+              <a:schemeClr val="accent6">
+                <a:lumMod val="50000"/>
+              </a:schemeClr>
+            </a:solidFill>
+          </a:ln>
         </p:spPr>
         <p:style>
           <a:lnRef idx="2">
@@ -5809,8 +7382,8 @@
         </p:nvCxnSpPr>
         <p:spPr>
           <a:xfrm flipV="1">
-            <a:off x="110691" y="5637288"/>
-            <a:ext cx="11203782" cy="56405"/>
+            <a:off x="110691" y="5628356"/>
+            <a:ext cx="10956731" cy="65339"/>
           </a:xfrm>
           <a:prstGeom prst="line">
             <a:avLst/>
@@ -6710,6 +8283,59 @@
           <a:p>
             <a:r>
               <a:rPr lang="en-US" dirty="0" smtClean="0"/>
+              <a:t>NFR </a:t>
+            </a:r>
+            <a:endParaRPr lang="en-US" dirty="0"/>
+          </a:p>
+        </p:txBody>
+      </p:sp>
+    </p:spTree>
+    <p:extLst>
+      <p:ext uri="{BB962C8B-B14F-4D97-AF65-F5344CB8AC3E}">
+        <p14:creationId xmlns:p14="http://schemas.microsoft.com/office/powerpoint/2010/main" val="2286662558"/>
+      </p:ext>
+    </p:extLst>
+  </p:cSld>
+  <p:clrMapOvr>
+    <a:masterClrMapping/>
+  </p:clrMapOvr>
+</p:sld>
+</file>
+
+<file path=ppt/slides/slide7.xml><?xml version="1.0" encoding="utf-8"?>
+<p:sld xmlns:a="http://schemas.openxmlformats.org/drawingml/2006/main" xmlns:r="http://schemas.openxmlformats.org/officeDocument/2006/relationships" xmlns:p="http://schemas.openxmlformats.org/presentationml/2006/main">
+  <p:cSld>
+    <p:spTree>
+      <p:nvGrpSpPr>
+        <p:cNvPr id="1" name=""/>
+        <p:cNvGrpSpPr/>
+        <p:nvPr/>
+      </p:nvGrpSpPr>
+      <p:grpSpPr>
+        <a:xfrm>
+          <a:off x="0" y="0"/>
+          <a:ext cx="0" cy="0"/>
+          <a:chOff x="0" y="0"/>
+          <a:chExt cx="0" cy="0"/>
+        </a:xfrm>
+      </p:grpSpPr>
+      <p:sp>
+        <p:nvSpPr>
+          <p:cNvPr id="2" name="Title 1"/>
+          <p:cNvSpPr>
+            <a:spLocks noGrp="1"/>
+          </p:cNvSpPr>
+          <p:nvPr>
+            <p:ph type="title"/>
+          </p:nvPr>
+        </p:nvSpPr>
+        <p:spPr/>
+        <p:txBody>
+          <a:bodyPr/>
+          <a:lstStyle/>
+          <a:p>
+            <a:r>
+              <a:rPr lang="en-US" dirty="0" smtClean="0"/>
               <a:t>Architecture Deliverables </a:t>
             </a:r>
             <a:endParaRPr lang="en-US" dirty="0"/>
@@ -7224,7 +8850,7 @@
 </p:sld>
 </file>
 
-<file path=ppt/slides/slide7.xml><?xml version="1.0" encoding="utf-8"?>
+<file path=ppt/slides/slide8.xml><?xml version="1.0" encoding="utf-8"?>
 <p:sld xmlns:a="http://schemas.openxmlformats.org/drawingml/2006/main" xmlns:r="http://schemas.openxmlformats.org/officeDocument/2006/relationships" xmlns:p="http://schemas.openxmlformats.org/presentationml/2006/main">
   <p:cSld>
     <p:spTree>

</xml_diff>

<commit_message>
Few more slide added in architecture
</commit_message>
<xml_diff>
--- a/interview/Architecture.pptx
+++ b/interview/Architecture.pptx
@@ -8,11 +8,12 @@
     <p:sldId id="256" r:id="rId2"/>
     <p:sldId id="257" r:id="rId3"/>
     <p:sldId id="260" r:id="rId4"/>
-    <p:sldId id="261" r:id="rId5"/>
-    <p:sldId id="262" r:id="rId6"/>
-    <p:sldId id="263" r:id="rId7"/>
-    <p:sldId id="258" r:id="rId8"/>
-    <p:sldId id="259" r:id="rId9"/>
+    <p:sldId id="264" r:id="rId5"/>
+    <p:sldId id="261" r:id="rId6"/>
+    <p:sldId id="262" r:id="rId7"/>
+    <p:sldId id="263" r:id="rId8"/>
+    <p:sldId id="258" r:id="rId9"/>
+    <p:sldId id="259" r:id="rId10"/>
   </p:sldIdLst>
   <p:sldSz cx="12192000" cy="6858000"/>
   <p:notesSz cx="6858000" cy="9144000"/>
@@ -250,7 +251,7 @@
           <a:p>
             <a:fld id="{A9EA6C2F-DDD7-47BE-89A1-39ECA27DEEB2}" type="datetimeFigureOut">
               <a:rPr lang="en-US" smtClean="0"/>
-              <a:t>8/22/2024</a:t>
+              <a:t>8/23/2024</a:t>
             </a:fld>
             <a:endParaRPr lang="en-US"/>
           </a:p>
@@ -420,7 +421,7 @@
           <a:p>
             <a:fld id="{A9EA6C2F-DDD7-47BE-89A1-39ECA27DEEB2}" type="datetimeFigureOut">
               <a:rPr lang="en-US" smtClean="0"/>
-              <a:t>8/22/2024</a:t>
+              <a:t>8/23/2024</a:t>
             </a:fld>
             <a:endParaRPr lang="en-US"/>
           </a:p>
@@ -600,7 +601,7 @@
           <a:p>
             <a:fld id="{A9EA6C2F-DDD7-47BE-89A1-39ECA27DEEB2}" type="datetimeFigureOut">
               <a:rPr lang="en-US" smtClean="0"/>
-              <a:t>8/22/2024</a:t>
+              <a:t>8/23/2024</a:t>
             </a:fld>
             <a:endParaRPr lang="en-US"/>
           </a:p>
@@ -770,7 +771,7 @@
           <a:p>
             <a:fld id="{A9EA6C2F-DDD7-47BE-89A1-39ECA27DEEB2}" type="datetimeFigureOut">
               <a:rPr lang="en-US" smtClean="0"/>
-              <a:t>8/22/2024</a:t>
+              <a:t>8/23/2024</a:t>
             </a:fld>
             <a:endParaRPr lang="en-US"/>
           </a:p>
@@ -1016,7 +1017,7 @@
           <a:p>
             <a:fld id="{A9EA6C2F-DDD7-47BE-89A1-39ECA27DEEB2}" type="datetimeFigureOut">
               <a:rPr lang="en-US" smtClean="0"/>
-              <a:t>8/22/2024</a:t>
+              <a:t>8/23/2024</a:t>
             </a:fld>
             <a:endParaRPr lang="en-US"/>
           </a:p>
@@ -1248,7 +1249,7 @@
           <a:p>
             <a:fld id="{A9EA6C2F-DDD7-47BE-89A1-39ECA27DEEB2}" type="datetimeFigureOut">
               <a:rPr lang="en-US" smtClean="0"/>
-              <a:t>8/22/2024</a:t>
+              <a:t>8/23/2024</a:t>
             </a:fld>
             <a:endParaRPr lang="en-US"/>
           </a:p>
@@ -1615,7 +1616,7 @@
           <a:p>
             <a:fld id="{A9EA6C2F-DDD7-47BE-89A1-39ECA27DEEB2}" type="datetimeFigureOut">
               <a:rPr lang="en-US" smtClean="0"/>
-              <a:t>8/22/2024</a:t>
+              <a:t>8/23/2024</a:t>
             </a:fld>
             <a:endParaRPr lang="en-US"/>
           </a:p>
@@ -1733,7 +1734,7 @@
           <a:p>
             <a:fld id="{A9EA6C2F-DDD7-47BE-89A1-39ECA27DEEB2}" type="datetimeFigureOut">
               <a:rPr lang="en-US" smtClean="0"/>
-              <a:t>8/22/2024</a:t>
+              <a:t>8/23/2024</a:t>
             </a:fld>
             <a:endParaRPr lang="en-US"/>
           </a:p>
@@ -1828,7 +1829,7 @@
           <a:p>
             <a:fld id="{A9EA6C2F-DDD7-47BE-89A1-39ECA27DEEB2}" type="datetimeFigureOut">
               <a:rPr lang="en-US" smtClean="0"/>
-              <a:t>8/22/2024</a:t>
+              <a:t>8/23/2024</a:t>
             </a:fld>
             <a:endParaRPr lang="en-US"/>
           </a:p>
@@ -2105,7 +2106,7 @@
           <a:p>
             <a:fld id="{A9EA6C2F-DDD7-47BE-89A1-39ECA27DEEB2}" type="datetimeFigureOut">
               <a:rPr lang="en-US" smtClean="0"/>
-              <a:t>8/22/2024</a:t>
+              <a:t>8/23/2024</a:t>
             </a:fld>
             <a:endParaRPr lang="en-US"/>
           </a:p>
@@ -2358,7 +2359,7 @@
           <a:p>
             <a:fld id="{A9EA6C2F-DDD7-47BE-89A1-39ECA27DEEB2}" type="datetimeFigureOut">
               <a:rPr lang="en-US" smtClean="0"/>
-              <a:t>8/22/2024</a:t>
+              <a:t>8/23/2024</a:t>
             </a:fld>
             <a:endParaRPr lang="en-US"/>
           </a:p>
@@ -2571,7 +2572,7 @@
           <a:p>
             <a:fld id="{A9EA6C2F-DDD7-47BE-89A1-39ECA27DEEB2}" type="datetimeFigureOut">
               <a:rPr lang="en-US" smtClean="0"/>
-              <a:t>8/22/2024</a:t>
+              <a:t>8/23/2024</a:t>
             </a:fld>
             <a:endParaRPr lang="en-US"/>
           </a:p>
@@ -4526,7 +4527,12 @@
             <p:ph type="title"/>
           </p:nvPr>
         </p:nvSpPr>
-        <p:spPr/>
+        <p:spPr>
+          <a:xfrm>
+            <a:off x="0" y="-65743"/>
+            <a:ext cx="10515600" cy="705824"/>
+          </a:xfrm>
+        </p:spPr>
         <p:txBody>
           <a:bodyPr/>
           <a:lstStyle/>
@@ -4547,7 +4553,7 @@
         </p:nvSpPr>
         <p:spPr>
           <a:xfrm>
-            <a:off x="1104900" y="1690688"/>
+            <a:off x="1144089" y="4159568"/>
             <a:ext cx="2641600" cy="963612"/>
           </a:xfrm>
           <a:prstGeom prst="chevron">
@@ -4599,7 +4605,7 @@
         </p:nvSpPr>
         <p:spPr>
           <a:xfrm>
-            <a:off x="8128000" y="1690688"/>
+            <a:off x="8167189" y="4159568"/>
             <a:ext cx="2641600" cy="963612"/>
           </a:xfrm>
           <a:prstGeom prst="chevron">
@@ -4651,7 +4657,7 @@
         </p:nvSpPr>
         <p:spPr>
           <a:xfrm>
-            <a:off x="5803900" y="1690688"/>
+            <a:off x="5843089" y="4159568"/>
             <a:ext cx="2641600" cy="963612"/>
           </a:xfrm>
           <a:prstGeom prst="chevron">
@@ -4703,7 +4709,7 @@
         </p:nvSpPr>
         <p:spPr>
           <a:xfrm>
-            <a:off x="3479800" y="1679576"/>
+            <a:off x="3518989" y="4148456"/>
             <a:ext cx="2641600" cy="963612"/>
           </a:xfrm>
           <a:prstGeom prst="chevron">
@@ -4761,7 +4767,7 @@
         </p:nvSpPr>
         <p:spPr>
           <a:xfrm>
-            <a:off x="1104900" y="2994027"/>
+            <a:off x="1144089" y="5462907"/>
             <a:ext cx="2641600" cy="963612"/>
           </a:xfrm>
           <a:prstGeom prst="chevron">
@@ -4803,11 +4809,6 @@
               </a:rPr>
               <a:t>Manageability</a:t>
             </a:r>
-            <a:endParaRPr lang="en-US" dirty="0">
-              <a:solidFill>
-                <a:schemeClr val="tx1"/>
-              </a:solidFill>
-            </a:endParaRPr>
           </a:p>
         </p:txBody>
       </p:sp>
@@ -4819,7 +4820,7 @@
         </p:nvSpPr>
         <p:spPr>
           <a:xfrm>
-            <a:off x="3479800" y="2979742"/>
+            <a:off x="3518989" y="5448622"/>
             <a:ext cx="2752188" cy="963612"/>
           </a:xfrm>
           <a:prstGeom prst="chevron">
@@ -4871,7 +4872,7 @@
         </p:nvSpPr>
         <p:spPr>
           <a:xfrm>
-            <a:off x="5994400" y="2971805"/>
+            <a:off x="6033589" y="5440685"/>
             <a:ext cx="2641600" cy="963612"/>
           </a:xfrm>
           <a:prstGeom prst="chevron">
@@ -4923,7 +4924,7 @@
         </p:nvSpPr>
         <p:spPr>
           <a:xfrm>
-            <a:off x="8369300" y="2963868"/>
+            <a:off x="8408489" y="5432748"/>
             <a:ext cx="2641600" cy="963612"/>
           </a:xfrm>
           <a:prstGeom prst="chevron">
@@ -4969,13 +4970,13 @@
       </p:sp>
       <p:sp>
         <p:nvSpPr>
-          <p:cNvPr id="12" name="Chevron 11"/>
+          <p:cNvPr id="17" name="Chevron 16"/>
           <p:cNvSpPr/>
           <p:nvPr/>
         </p:nvSpPr>
         <p:spPr>
           <a:xfrm>
-            <a:off x="2641600" y="4622715"/>
+            <a:off x="2680789" y="860601"/>
             <a:ext cx="2641600" cy="963612"/>
           </a:xfrm>
           <a:prstGeom prst="chevron">
@@ -5042,13 +5043,13 @@
       </p:sp>
       <p:sp>
         <p:nvSpPr>
-          <p:cNvPr id="13" name="Chevron 12"/>
+          <p:cNvPr id="18" name="Chevron 17"/>
           <p:cNvSpPr/>
           <p:nvPr/>
         </p:nvSpPr>
         <p:spPr>
           <a:xfrm>
-            <a:off x="2641600" y="5614875"/>
+            <a:off x="2680789" y="1852761"/>
             <a:ext cx="2641600" cy="963612"/>
           </a:xfrm>
           <a:prstGeom prst="chevron">
@@ -5107,13 +5108,13 @@
       </p:sp>
       <p:sp>
         <p:nvSpPr>
-          <p:cNvPr id="14" name="Chevron 13"/>
+          <p:cNvPr id="19" name="Chevron 18"/>
           <p:cNvSpPr/>
           <p:nvPr/>
         </p:nvSpPr>
         <p:spPr>
           <a:xfrm>
-            <a:off x="0" y="4662375"/>
+            <a:off x="39189" y="900261"/>
             <a:ext cx="2641600" cy="963612"/>
           </a:xfrm>
           <a:prstGeom prst="chevron">
@@ -5172,13 +5173,13 @@
       </p:sp>
       <p:sp>
         <p:nvSpPr>
-          <p:cNvPr id="15" name="Chevron 14"/>
+          <p:cNvPr id="20" name="Chevron 19"/>
           <p:cNvSpPr/>
           <p:nvPr/>
         </p:nvSpPr>
         <p:spPr>
           <a:xfrm>
-            <a:off x="0" y="5643423"/>
+            <a:off x="39189" y="1881309"/>
             <a:ext cx="2641600" cy="963612"/>
           </a:xfrm>
           <a:prstGeom prst="chevron">
@@ -5231,6 +5232,191 @@
                 <a:schemeClr val="tx1"/>
               </a:solidFill>
             </a:endParaRPr>
+          </a:p>
+        </p:txBody>
+      </p:sp>
+      <p:sp>
+        <p:nvSpPr>
+          <p:cNvPr id="21" name="Right Brace 20"/>
+          <p:cNvSpPr/>
+          <p:nvPr/>
+        </p:nvSpPr>
+        <p:spPr>
+          <a:xfrm>
+            <a:off x="5551715" y="718446"/>
+            <a:ext cx="1267097" cy="2097927"/>
+          </a:xfrm>
+          <a:prstGeom prst="rightBrace">
+            <a:avLst/>
+          </a:prstGeom>
+        </p:spPr>
+        <p:style>
+          <a:lnRef idx="1">
+            <a:schemeClr val="accent1"/>
+          </a:lnRef>
+          <a:fillRef idx="0">
+            <a:schemeClr val="accent1"/>
+          </a:fillRef>
+          <a:effectRef idx="0">
+            <a:schemeClr val="accent1"/>
+          </a:effectRef>
+          <a:fontRef idx="minor">
+            <a:schemeClr val="tx1"/>
+          </a:fontRef>
+        </p:style>
+        <p:txBody>
+          <a:bodyPr rtlCol="0" anchor="ctr"/>
+          <a:lstStyle/>
+          <a:p>
+            <a:pPr algn="ctr"/>
+            <a:endParaRPr lang="en-US"/>
+          </a:p>
+        </p:txBody>
+      </p:sp>
+      <p:sp>
+        <p:nvSpPr>
+          <p:cNvPr id="22" name="TextBox 21"/>
+          <p:cNvSpPr txBox="1"/>
+          <p:nvPr/>
+        </p:nvSpPr>
+        <p:spPr>
+          <a:xfrm>
+            <a:off x="7132320" y="1580595"/>
+            <a:ext cx="2031903" cy="369332"/>
+          </a:xfrm>
+          <a:prstGeom prst="rect">
+            <a:avLst/>
+          </a:prstGeom>
+          <a:noFill/>
+        </p:spPr>
+        <p:txBody>
+          <a:bodyPr wrap="none" rtlCol="0">
+            <a:spAutoFit/>
+          </a:bodyPr>
+          <a:lstStyle/>
+          <a:p>
+            <a:r>
+              <a:rPr lang="en-US" dirty="0" smtClean="0"/>
+              <a:t>Owner Preferences </a:t>
+            </a:r>
+            <a:endParaRPr lang="en-US" dirty="0"/>
+          </a:p>
+        </p:txBody>
+      </p:sp>
+      <p:sp>
+        <p:nvSpPr>
+          <p:cNvPr id="23" name="Down Arrow 22"/>
+          <p:cNvSpPr/>
+          <p:nvPr/>
+        </p:nvSpPr>
+        <p:spPr>
+          <a:xfrm>
+            <a:off x="2312126" y="2984492"/>
+            <a:ext cx="2741966" cy="978408"/>
+          </a:xfrm>
+          <a:prstGeom prst="downArrow">
+            <a:avLst/>
+          </a:prstGeom>
+        </p:spPr>
+        <p:style>
+          <a:lnRef idx="2">
+            <a:schemeClr val="accent1">
+              <a:shade val="50000"/>
+            </a:schemeClr>
+          </a:lnRef>
+          <a:fillRef idx="1">
+            <a:schemeClr val="accent1"/>
+          </a:fillRef>
+          <a:effectRef idx="0">
+            <a:schemeClr val="accent1"/>
+          </a:effectRef>
+          <a:fontRef idx="minor">
+            <a:schemeClr val="lt1"/>
+          </a:fontRef>
+        </p:style>
+        <p:txBody>
+          <a:bodyPr rtlCol="0" anchor="ctr"/>
+          <a:lstStyle/>
+          <a:p>
+            <a:pPr algn="ctr"/>
+            <a:endParaRPr lang="en-US"/>
+          </a:p>
+        </p:txBody>
+      </p:sp>
+      <p:sp>
+        <p:nvSpPr>
+          <p:cNvPr id="24" name="Right Brace 23"/>
+          <p:cNvSpPr/>
+          <p:nvPr/>
+        </p:nvSpPr>
+        <p:spPr>
+          <a:xfrm>
+            <a:off x="430894" y="4159568"/>
+            <a:ext cx="684083" cy="2266951"/>
+          </a:xfrm>
+          <a:prstGeom prst="rightBrace">
+            <a:avLst>
+              <a:gd name="adj1" fmla="val 8333"/>
+              <a:gd name="adj2" fmla="val 51245"/>
+            </a:avLst>
+          </a:prstGeom>
+        </p:spPr>
+        <p:style>
+          <a:lnRef idx="1">
+            <a:schemeClr val="accent1"/>
+          </a:lnRef>
+          <a:fillRef idx="0">
+            <a:schemeClr val="accent1"/>
+          </a:fillRef>
+          <a:effectRef idx="0">
+            <a:schemeClr val="accent1"/>
+          </a:effectRef>
+          <a:fontRef idx="minor">
+            <a:schemeClr val="tx1"/>
+          </a:fontRef>
+        </p:style>
+        <p:txBody>
+          <a:bodyPr rtlCol="0" anchor="ctr"/>
+          <a:lstStyle/>
+          <a:p>
+            <a:pPr algn="ctr"/>
+            <a:endParaRPr lang="en-US"/>
+          </a:p>
+        </p:txBody>
+      </p:sp>
+      <p:sp>
+        <p:nvSpPr>
+          <p:cNvPr id="25" name="TextBox 24"/>
+          <p:cNvSpPr txBox="1"/>
+          <p:nvPr/>
+        </p:nvSpPr>
+        <p:spPr>
+          <a:xfrm>
+            <a:off x="76809" y="4996682"/>
+            <a:ext cx="1413016" cy="646331"/>
+          </a:xfrm>
+          <a:prstGeom prst="rect">
+            <a:avLst/>
+          </a:prstGeom>
+          <a:noFill/>
+        </p:spPr>
+        <p:txBody>
+          <a:bodyPr wrap="none" rtlCol="0">
+            <a:spAutoFit/>
+          </a:bodyPr>
+          <a:lstStyle/>
+          <a:p>
+            <a:r>
+              <a:rPr lang="en-US" dirty="0" smtClean="0"/>
+              <a:t>Implementer</a:t>
+            </a:r>
+          </a:p>
+          <a:p>
+            <a:r>
+              <a:rPr lang="en-US" dirty="0" smtClean="0"/>
+              <a:t> Preferences </a:t>
+            </a:r>
+            <a:endParaRPr lang="en-US" dirty="0"/>
           </a:p>
         </p:txBody>
       </p:sp>
@@ -5312,7 +5498,17 @@
                   </a:schemeClr>
                 </a:solidFill>
               </a:rPr>
-              <a:t>Phase 3 : Support</a:t>
+              <a:t>Phase 3 : </a:t>
+            </a:r>
+            <a:r>
+              <a:rPr lang="en-US" dirty="0" smtClean="0">
+                <a:solidFill>
+                  <a:schemeClr val="accent6">
+                    <a:lumMod val="50000"/>
+                  </a:schemeClr>
+                </a:solidFill>
+              </a:rPr>
+              <a:t>Deployment &amp; Support ( Operation)</a:t>
             </a:r>
             <a:endParaRPr lang="en-US" dirty="0">
               <a:solidFill>
@@ -5457,8 +5653,8 @@
         </p:nvSpPr>
         <p:spPr>
           <a:xfrm>
-            <a:off x="3344092" y="3386899"/>
-            <a:ext cx="1745532" cy="1063794"/>
+            <a:off x="3344092" y="3386898"/>
+            <a:ext cx="1745532" cy="1150095"/>
           </a:xfrm>
           <a:prstGeom prst="rect">
             <a:avLst/>
@@ -6360,7 +6556,7 @@
         </p:nvSpPr>
         <p:spPr>
           <a:xfrm>
-            <a:off x="3577490" y="3386899"/>
+            <a:off x="3535852" y="3372782"/>
             <a:ext cx="1374756" cy="622974"/>
           </a:xfrm>
           <a:prstGeom prst="ellipse">
@@ -6427,7 +6623,7 @@
         </p:nvSpPr>
         <p:spPr>
           <a:xfrm>
-            <a:off x="3577490" y="3827719"/>
+            <a:off x="3726866" y="3762391"/>
             <a:ext cx="1438130" cy="541081"/>
           </a:xfrm>
           <a:prstGeom prst="ellipse">
@@ -7995,6 +8191,68 @@
           </a:p>
         </p:txBody>
       </p:sp>
+      <p:sp>
+        <p:nvSpPr>
+          <p:cNvPr id="83" name="Oval 82"/>
+          <p:cNvSpPr/>
+          <p:nvPr/>
+        </p:nvSpPr>
+        <p:spPr>
+          <a:xfrm>
+            <a:off x="3337914" y="4163084"/>
+            <a:ext cx="1283691" cy="434817"/>
+          </a:xfrm>
+          <a:prstGeom prst="ellipse">
+            <a:avLst/>
+          </a:prstGeom>
+          <a:solidFill>
+            <a:srgbClr val="FF0000"/>
+          </a:solidFill>
+          <a:ln w="28575">
+            <a:solidFill>
+              <a:schemeClr val="accent6">
+                <a:lumMod val="50000"/>
+              </a:schemeClr>
+            </a:solidFill>
+          </a:ln>
+        </p:spPr>
+        <p:style>
+          <a:lnRef idx="2">
+            <a:schemeClr val="accent1">
+              <a:shade val="50000"/>
+            </a:schemeClr>
+          </a:lnRef>
+          <a:fillRef idx="1">
+            <a:schemeClr val="accent1"/>
+          </a:fillRef>
+          <a:effectRef idx="0">
+            <a:schemeClr val="accent1"/>
+          </a:effectRef>
+          <a:fontRef idx="minor">
+            <a:schemeClr val="lt1"/>
+          </a:fontRef>
+        </p:style>
+        <p:txBody>
+          <a:bodyPr rtlCol="0" anchor="ctr"/>
+          <a:lstStyle/>
+          <a:p>
+            <a:pPr algn="ctr"/>
+            <a:r>
+              <a:rPr lang="en-US" sz="1100" dirty="0" smtClean="0">
+                <a:solidFill>
+                  <a:srgbClr val="7030A0"/>
+                </a:solidFill>
+              </a:rPr>
+              <a:t>Budget</a:t>
+            </a:r>
+            <a:endParaRPr lang="en-US" sz="1100" dirty="0">
+              <a:solidFill>
+                <a:srgbClr val="7030A0"/>
+              </a:solidFill>
+            </a:endParaRPr>
+          </a:p>
+        </p:txBody>
+      </p:sp>
     </p:spTree>
     <p:extLst>
       <p:ext uri="{BB962C8B-B14F-4D97-AF65-F5344CB8AC3E}">
@@ -8037,8 +8295,8 @@
         </p:nvSpPr>
         <p:spPr>
           <a:xfrm>
-            <a:off x="111512" y="-58580"/>
-            <a:ext cx="10515600" cy="1325563"/>
+            <a:off x="111035" y="0"/>
+            <a:ext cx="6302828" cy="1325563"/>
           </a:xfrm>
         </p:spPr>
         <p:txBody>
@@ -8046,114 +8304,622 @@
           <a:lstStyle/>
           <a:p>
             <a:r>
-              <a:rPr lang="en-US" dirty="0" err="1" smtClean="0"/>
-              <a:t>Zachman</a:t>
+              <a:rPr lang="en-US" dirty="0" smtClean="0"/>
+              <a:t>Different type Architecture</a:t>
             </a:r>
             <a:endParaRPr lang="en-US" dirty="0"/>
           </a:p>
         </p:txBody>
       </p:sp>
-      <p:pic>
-        <p:nvPicPr>
-          <p:cNvPr id="1026" name="Picture 2" descr="https://zachman-feac.com/images/ZI_PIcs/ZF3.jpg"/>
-          <p:cNvPicPr>
-            <a:picLocks noGrp="1" noChangeAspect="1" noChangeArrowheads="1"/>
-          </p:cNvPicPr>
-          <p:nvPr>
-            <p:ph idx="1"/>
-          </p:nvPr>
-        </p:nvPicPr>
-        <p:blipFill>
-          <a:blip r:embed="rId2">
-            <a:extLst>
-              <a:ext uri="{28A0092B-C50C-407E-A947-70E740481C1C}">
-                <a14:useLocalDpi xmlns:a14="http://schemas.microsoft.com/office/drawing/2010/main" val="0"/>
-              </a:ext>
-            </a:extLst>
-          </a:blip>
-          <a:srcRect/>
-          <a:stretch>
-            <a:fillRect/>
-          </a:stretch>
-        </p:blipFill>
-        <p:spPr bwMode="auto">
-          <a:xfrm>
-            <a:off x="2767361" y="604202"/>
-            <a:ext cx="7859751" cy="6073444"/>
+      <p:sp>
+        <p:nvSpPr>
+          <p:cNvPr id="4" name="Rectangle 3"/>
+          <p:cNvSpPr/>
+          <p:nvPr/>
+        </p:nvSpPr>
+        <p:spPr>
+          <a:xfrm>
+            <a:off x="1254035" y="2011680"/>
+            <a:ext cx="4114800" cy="914400"/>
           </a:xfrm>
           <a:prstGeom prst="rect">
             <a:avLst/>
           </a:prstGeom>
-          <a:noFill/>
-          <a:extLst>
-            <a:ext uri="{909E8E84-426E-40DD-AFC4-6F175D3DCCD1}">
-              <a14:hiddenFill xmlns:a14="http://schemas.microsoft.com/office/drawing/2010/main">
-                <a:solidFill>
-                  <a:srgbClr val="FFFFFF"/>
-                </a:solidFill>
-              </a14:hiddenFill>
-            </a:ext>
-          </a:extLst>
         </p:spPr>
-      </p:pic>
-      <p:sp>
-        <p:nvSpPr>
-          <p:cNvPr id="4" name="TextBox 3"/>
-          <p:cNvSpPr txBox="1"/>
+        <p:style>
+          <a:lnRef idx="2">
+            <a:schemeClr val="accent1">
+              <a:shade val="50000"/>
+            </a:schemeClr>
+          </a:lnRef>
+          <a:fillRef idx="1">
+            <a:schemeClr val="accent1"/>
+          </a:fillRef>
+          <a:effectRef idx="0">
+            <a:schemeClr val="accent1"/>
+          </a:effectRef>
+          <a:fontRef idx="minor">
+            <a:schemeClr val="lt1"/>
+          </a:fontRef>
+        </p:style>
+        <p:txBody>
+          <a:bodyPr rtlCol="0" anchor="ctr"/>
+          <a:lstStyle/>
+          <a:p>
+            <a:pPr algn="ctr"/>
+            <a:r>
+              <a:rPr lang="en-US" dirty="0" smtClean="0"/>
+              <a:t>Application Architecture </a:t>
+            </a:r>
+            <a:endParaRPr lang="en-US" dirty="0"/>
+          </a:p>
+        </p:txBody>
+      </p:sp>
+      <p:sp>
+        <p:nvSpPr>
+          <p:cNvPr id="5" name="Rectangle 4"/>
+          <p:cNvSpPr/>
           <p:nvPr/>
         </p:nvSpPr>
         <p:spPr>
           <a:xfrm>
-            <a:off x="0" y="2753710"/>
-            <a:ext cx="2767361" cy="3139321"/>
+            <a:off x="1254035" y="3091543"/>
+            <a:ext cx="4114800" cy="914400"/>
           </a:xfrm>
           <a:prstGeom prst="rect">
             <a:avLst/>
           </a:prstGeom>
-          <a:noFill/>
         </p:spPr>
-        <p:txBody>
-          <a:bodyPr wrap="square" rtlCol="0">
-            <a:spAutoFit/>
-          </a:bodyPr>
-          <a:lstStyle/>
-          <a:p>
+        <p:style>
+          <a:lnRef idx="2">
+            <a:schemeClr val="accent1">
+              <a:shade val="50000"/>
+            </a:schemeClr>
+          </a:lnRef>
+          <a:fillRef idx="1">
+            <a:schemeClr val="accent1"/>
+          </a:fillRef>
+          <a:effectRef idx="0">
+            <a:schemeClr val="accent1"/>
+          </a:effectRef>
+          <a:fontRef idx="minor">
+            <a:schemeClr val="lt1"/>
+          </a:fontRef>
+        </p:style>
+        <p:txBody>
+          <a:bodyPr rtlCol="0" anchor="ctr"/>
+          <a:lstStyle/>
+          <a:p>
+            <a:pPr algn="ctr"/>
             <a:r>
               <a:rPr lang="en-US" dirty="0" smtClean="0"/>
-              <a:t>Zach man only set context  but not more Architect thinking</a:t>
-            </a:r>
-          </a:p>
-          <a:p>
+              <a:t>Security Architecture </a:t>
+            </a:r>
             <a:endParaRPr lang="en-US" dirty="0"/>
           </a:p>
-          <a:p>
+        </p:txBody>
+      </p:sp>
+      <p:sp>
+        <p:nvSpPr>
+          <p:cNvPr id="6" name="Rectangle 5"/>
+          <p:cNvSpPr/>
+          <p:nvPr/>
+        </p:nvSpPr>
+        <p:spPr>
+          <a:xfrm>
+            <a:off x="1254035" y="4171406"/>
+            <a:ext cx="4114800" cy="914400"/>
+          </a:xfrm>
+          <a:prstGeom prst="rect">
+            <a:avLst/>
+          </a:prstGeom>
+        </p:spPr>
+        <p:style>
+          <a:lnRef idx="2">
+            <a:schemeClr val="accent1">
+              <a:shade val="50000"/>
+            </a:schemeClr>
+          </a:lnRef>
+          <a:fillRef idx="1">
+            <a:schemeClr val="accent1"/>
+          </a:fillRef>
+          <a:effectRef idx="0">
+            <a:schemeClr val="accent1"/>
+          </a:effectRef>
+          <a:fontRef idx="minor">
+            <a:schemeClr val="lt1"/>
+          </a:fontRef>
+        </p:style>
+        <p:txBody>
+          <a:bodyPr rtlCol="0" anchor="ctr"/>
+          <a:lstStyle/>
+          <a:p>
+            <a:pPr algn="ctr"/>
             <a:r>
               <a:rPr lang="en-US" dirty="0" smtClean="0"/>
-              <a:t>Architect is responsible at each level</a:t>
-            </a:r>
-          </a:p>
-          <a:p>
+              <a:t>Deployment Architecture </a:t>
+            </a:r>
+            <a:endParaRPr lang="en-US" dirty="0"/>
+          </a:p>
+        </p:txBody>
+      </p:sp>
+      <p:sp>
+        <p:nvSpPr>
+          <p:cNvPr id="7" name="Right Brace 6"/>
+          <p:cNvSpPr/>
+          <p:nvPr/>
+        </p:nvSpPr>
+        <p:spPr>
+          <a:xfrm flipH="1">
+            <a:off x="7036525" y="1601048"/>
+            <a:ext cx="875211" cy="3730398"/>
+          </a:xfrm>
+          <a:prstGeom prst="rightBrace">
+            <a:avLst/>
+          </a:prstGeom>
+        </p:spPr>
+        <p:style>
+          <a:lnRef idx="1">
+            <a:schemeClr val="accent1"/>
+          </a:lnRef>
+          <a:fillRef idx="0">
+            <a:schemeClr val="accent1"/>
+          </a:fillRef>
+          <a:effectRef idx="0">
+            <a:schemeClr val="accent1"/>
+          </a:effectRef>
+          <a:fontRef idx="minor">
+            <a:schemeClr val="tx1"/>
+          </a:fontRef>
+        </p:style>
+        <p:txBody>
+          <a:bodyPr rtlCol="0" anchor="ctr"/>
+          <a:lstStyle/>
+          <a:p>
+            <a:pPr algn="ctr"/>
+            <a:endParaRPr lang="en-US"/>
+          </a:p>
+        </p:txBody>
+      </p:sp>
+      <p:sp>
+        <p:nvSpPr>
+          <p:cNvPr id="8" name="Hexagon 7"/>
+          <p:cNvSpPr/>
+          <p:nvPr/>
+        </p:nvSpPr>
+        <p:spPr>
+          <a:xfrm>
+            <a:off x="7955280" y="4127863"/>
+            <a:ext cx="2220685" cy="1293223"/>
+          </a:xfrm>
+          <a:prstGeom prst="hexagon">
+            <a:avLst/>
+          </a:prstGeom>
+        </p:spPr>
+        <p:style>
+          <a:lnRef idx="2">
+            <a:schemeClr val="accent1">
+              <a:shade val="50000"/>
+            </a:schemeClr>
+          </a:lnRef>
+          <a:fillRef idx="1">
+            <a:schemeClr val="accent1"/>
+          </a:fillRef>
+          <a:effectRef idx="0">
+            <a:schemeClr val="accent1"/>
+          </a:effectRef>
+          <a:fontRef idx="minor">
+            <a:schemeClr val="lt1"/>
+          </a:fontRef>
+        </p:style>
+        <p:txBody>
+          <a:bodyPr rtlCol="0" anchor="ctr"/>
+          <a:lstStyle/>
+          <a:p>
+            <a:pPr algn="ctr"/>
             <a:r>
               <a:rPr lang="en-US" dirty="0" smtClean="0"/>
-              <a:t>2 major stake holder</a:t>
-            </a:r>
-          </a:p>
-          <a:p>
+              <a:t>Diagram</a:t>
+            </a:r>
+            <a:endParaRPr lang="en-US" dirty="0"/>
+          </a:p>
+        </p:txBody>
+      </p:sp>
+      <p:sp>
+        <p:nvSpPr>
+          <p:cNvPr id="9" name="Hexagon 8"/>
+          <p:cNvSpPr/>
+          <p:nvPr/>
+        </p:nvSpPr>
+        <p:spPr>
+          <a:xfrm>
+            <a:off x="7955280" y="1541417"/>
+            <a:ext cx="2220685" cy="1293223"/>
+          </a:xfrm>
+          <a:prstGeom prst="hexagon">
+            <a:avLst/>
+          </a:prstGeom>
+        </p:spPr>
+        <p:style>
+          <a:lnRef idx="2">
+            <a:schemeClr val="accent1">
+              <a:shade val="50000"/>
+            </a:schemeClr>
+          </a:lnRef>
+          <a:fillRef idx="1">
+            <a:schemeClr val="accent1"/>
+          </a:fillRef>
+          <a:effectRef idx="0">
+            <a:schemeClr val="accent1"/>
+          </a:effectRef>
+          <a:fontRef idx="minor">
+            <a:schemeClr val="lt1"/>
+          </a:fontRef>
+        </p:style>
+        <p:txBody>
+          <a:bodyPr rtlCol="0" anchor="ctr"/>
+          <a:lstStyle/>
+          <a:p>
+            <a:pPr algn="ctr"/>
             <a:r>
               <a:rPr lang="en-US" dirty="0" smtClean="0"/>
-              <a:t>Provider &amp; Implementer</a:t>
-            </a:r>
-          </a:p>
-          <a:p>
+              <a:t>Catalog</a:t>
+            </a:r>
+            <a:endParaRPr lang="en-US" dirty="0"/>
+          </a:p>
+        </p:txBody>
+      </p:sp>
+      <p:sp>
+        <p:nvSpPr>
+          <p:cNvPr id="10" name="Hexagon 9"/>
+          <p:cNvSpPr/>
+          <p:nvPr/>
+        </p:nvSpPr>
+        <p:spPr>
+          <a:xfrm>
+            <a:off x="7955280" y="2834640"/>
+            <a:ext cx="2220685" cy="1293223"/>
+          </a:xfrm>
+          <a:prstGeom prst="hexagon">
+            <a:avLst/>
+          </a:prstGeom>
+        </p:spPr>
+        <p:style>
+          <a:lnRef idx="2">
+            <a:schemeClr val="accent1">
+              <a:shade val="50000"/>
+            </a:schemeClr>
+          </a:lnRef>
+          <a:fillRef idx="1">
+            <a:schemeClr val="accent1"/>
+          </a:fillRef>
+          <a:effectRef idx="0">
+            <a:schemeClr val="accent1"/>
+          </a:effectRef>
+          <a:fontRef idx="minor">
+            <a:schemeClr val="lt1"/>
+          </a:fontRef>
+        </p:style>
+        <p:txBody>
+          <a:bodyPr rtlCol="0" anchor="ctr"/>
+          <a:lstStyle/>
+          <a:p>
+            <a:pPr algn="ctr"/>
             <a:r>
               <a:rPr lang="en-US" dirty="0" smtClean="0"/>
-              <a:t>2 thing more important </a:t>
-            </a:r>
-          </a:p>
-          <a:p>
+              <a:t>Matrix</a:t>
+            </a:r>
+            <a:endParaRPr lang="en-US" dirty="0"/>
+          </a:p>
+        </p:txBody>
+      </p:sp>
+      <p:sp>
+        <p:nvSpPr>
+          <p:cNvPr id="11" name="Rectangle 10"/>
+          <p:cNvSpPr/>
+          <p:nvPr/>
+        </p:nvSpPr>
+        <p:spPr>
+          <a:xfrm>
+            <a:off x="3589021" y="974563"/>
+            <a:ext cx="1835330" cy="508837"/>
+          </a:xfrm>
+          <a:prstGeom prst="rect">
+            <a:avLst/>
+          </a:prstGeom>
+        </p:spPr>
+        <p:style>
+          <a:lnRef idx="2">
+            <a:schemeClr val="accent1">
+              <a:shade val="50000"/>
+            </a:schemeClr>
+          </a:lnRef>
+          <a:fillRef idx="1">
+            <a:schemeClr val="accent1"/>
+          </a:fillRef>
+          <a:effectRef idx="0">
+            <a:schemeClr val="accent1"/>
+          </a:effectRef>
+          <a:fontRef idx="minor">
+            <a:schemeClr val="lt1"/>
+          </a:fontRef>
+        </p:style>
+        <p:txBody>
+          <a:bodyPr rtlCol="0" anchor="ctr"/>
+          <a:lstStyle/>
+          <a:p>
+            <a:pPr algn="ctr"/>
             <a:r>
               <a:rPr lang="en-US" dirty="0" smtClean="0"/>
-              <a:t>Data (What) How (Logic) rest is optional </a:t>
+              <a:t>HLD</a:t>
+            </a:r>
+            <a:endParaRPr lang="en-US" dirty="0"/>
+          </a:p>
+        </p:txBody>
+      </p:sp>
+      <p:sp>
+        <p:nvSpPr>
+          <p:cNvPr id="12" name="Rectangle 11"/>
+          <p:cNvSpPr/>
+          <p:nvPr/>
+        </p:nvSpPr>
+        <p:spPr>
+          <a:xfrm>
+            <a:off x="3589021" y="1489308"/>
+            <a:ext cx="1835330" cy="508837"/>
+          </a:xfrm>
+          <a:prstGeom prst="rect">
+            <a:avLst/>
+          </a:prstGeom>
+        </p:spPr>
+        <p:style>
+          <a:lnRef idx="2">
+            <a:schemeClr val="accent1">
+              <a:shade val="50000"/>
+            </a:schemeClr>
+          </a:lnRef>
+          <a:fillRef idx="1">
+            <a:schemeClr val="accent1"/>
+          </a:fillRef>
+          <a:effectRef idx="0">
+            <a:schemeClr val="accent1"/>
+          </a:effectRef>
+          <a:fontRef idx="minor">
+            <a:schemeClr val="lt1"/>
+          </a:fontRef>
+        </p:style>
+        <p:txBody>
+          <a:bodyPr rtlCol="0" anchor="ctr"/>
+          <a:lstStyle/>
+          <a:p>
+            <a:pPr algn="ctr"/>
+            <a:r>
+              <a:rPr lang="en-US" dirty="0"/>
+              <a:t>L</a:t>
+            </a:r>
+            <a:r>
+              <a:rPr lang="en-US" dirty="0" smtClean="0"/>
+              <a:t>LD</a:t>
+            </a:r>
+            <a:endParaRPr lang="en-US" dirty="0"/>
+          </a:p>
+        </p:txBody>
+      </p:sp>
+      <p:sp>
+        <p:nvSpPr>
+          <p:cNvPr id="13" name="Rectangle 12"/>
+          <p:cNvSpPr/>
+          <p:nvPr/>
+        </p:nvSpPr>
+        <p:spPr>
+          <a:xfrm>
+            <a:off x="5256711" y="1032580"/>
+            <a:ext cx="1888671" cy="1136937"/>
+          </a:xfrm>
+          <a:prstGeom prst="rect">
+            <a:avLst/>
+          </a:prstGeom>
+        </p:spPr>
+        <p:style>
+          <a:lnRef idx="2">
+            <a:schemeClr val="accent1">
+              <a:shade val="50000"/>
+            </a:schemeClr>
+          </a:lnRef>
+          <a:fillRef idx="1">
+            <a:schemeClr val="accent1"/>
+          </a:fillRef>
+          <a:effectRef idx="0">
+            <a:schemeClr val="accent1"/>
+          </a:effectRef>
+          <a:fontRef idx="minor">
+            <a:schemeClr val="lt1"/>
+          </a:fontRef>
+        </p:style>
+        <p:txBody>
+          <a:bodyPr rtlCol="0" anchor="ctr"/>
+          <a:lstStyle/>
+          <a:p>
+            <a:pPr algn="ctr"/>
+            <a:r>
+              <a:rPr lang="en-US" dirty="0" smtClean="0"/>
+              <a:t>Design &amp; Functional traceability</a:t>
+            </a:r>
+            <a:endParaRPr lang="en-US" dirty="0"/>
+          </a:p>
+        </p:txBody>
+      </p:sp>
+      <p:sp>
+        <p:nvSpPr>
+          <p:cNvPr id="14" name="Round Same Side Corner Rectangle 13"/>
+          <p:cNvSpPr/>
+          <p:nvPr/>
+        </p:nvSpPr>
+        <p:spPr>
+          <a:xfrm>
+            <a:off x="770709" y="5331446"/>
+            <a:ext cx="3579222" cy="912600"/>
+          </a:xfrm>
+          <a:prstGeom prst="round2SameRect">
+            <a:avLst/>
+          </a:prstGeom>
+        </p:spPr>
+        <p:style>
+          <a:lnRef idx="2">
+            <a:schemeClr val="accent1">
+              <a:shade val="50000"/>
+            </a:schemeClr>
+          </a:lnRef>
+          <a:fillRef idx="1">
+            <a:schemeClr val="accent1"/>
+          </a:fillRef>
+          <a:effectRef idx="0">
+            <a:schemeClr val="accent1"/>
+          </a:effectRef>
+          <a:fontRef idx="minor">
+            <a:schemeClr val="lt1"/>
+          </a:fontRef>
+        </p:style>
+        <p:txBody>
+          <a:bodyPr rtlCol="0" anchor="ctr"/>
+          <a:lstStyle/>
+          <a:p>
+            <a:pPr algn="ctr"/>
+            <a:r>
+              <a:rPr lang="en-US" dirty="0" smtClean="0"/>
+              <a:t>Reference Architecture </a:t>
+            </a:r>
+            <a:endParaRPr lang="en-US" dirty="0"/>
+          </a:p>
+        </p:txBody>
+      </p:sp>
+      <p:sp>
+        <p:nvSpPr>
+          <p:cNvPr id="15" name="Round Same Side Corner Rectangle 14"/>
+          <p:cNvSpPr/>
+          <p:nvPr/>
+        </p:nvSpPr>
+        <p:spPr>
+          <a:xfrm>
+            <a:off x="4430485" y="5305321"/>
+            <a:ext cx="3043645" cy="912600"/>
+          </a:xfrm>
+          <a:prstGeom prst="round2SameRect">
+            <a:avLst/>
+          </a:prstGeom>
+        </p:spPr>
+        <p:style>
+          <a:lnRef idx="2">
+            <a:schemeClr val="accent1">
+              <a:shade val="50000"/>
+            </a:schemeClr>
+          </a:lnRef>
+          <a:fillRef idx="1">
+            <a:schemeClr val="accent1"/>
+          </a:fillRef>
+          <a:effectRef idx="0">
+            <a:schemeClr val="accent1"/>
+          </a:effectRef>
+          <a:fontRef idx="minor">
+            <a:schemeClr val="lt1"/>
+          </a:fontRef>
+        </p:style>
+        <p:txBody>
+          <a:bodyPr rtlCol="0" anchor="ctr"/>
+          <a:lstStyle/>
+          <a:p>
+            <a:pPr algn="ctr"/>
+            <a:r>
+              <a:rPr lang="en-US" dirty="0" smtClean="0"/>
+              <a:t>Specific Architecture </a:t>
+            </a:r>
+            <a:endParaRPr lang="en-US" dirty="0"/>
+          </a:p>
+        </p:txBody>
+      </p:sp>
+      <p:sp>
+        <p:nvSpPr>
+          <p:cNvPr id="16" name="Rectangle 15"/>
+          <p:cNvSpPr/>
+          <p:nvPr/>
+        </p:nvSpPr>
+        <p:spPr>
+          <a:xfrm>
+            <a:off x="339635" y="1668622"/>
+            <a:ext cx="914400" cy="672582"/>
+          </a:xfrm>
+          <a:prstGeom prst="rect">
+            <a:avLst/>
+          </a:prstGeom>
+        </p:spPr>
+        <p:style>
+          <a:lnRef idx="2">
+            <a:schemeClr val="accent1">
+              <a:shade val="50000"/>
+            </a:schemeClr>
+          </a:lnRef>
+          <a:fillRef idx="1">
+            <a:schemeClr val="accent1"/>
+          </a:fillRef>
+          <a:effectRef idx="0">
+            <a:schemeClr val="accent1"/>
+          </a:effectRef>
+          <a:fontRef idx="minor">
+            <a:schemeClr val="lt1"/>
+          </a:fontRef>
+        </p:style>
+        <p:txBody>
+          <a:bodyPr rtlCol="0" anchor="ctr"/>
+          <a:lstStyle/>
+          <a:p>
+            <a:pPr algn="ctr"/>
+            <a:r>
+              <a:rPr lang="en-US" dirty="0" smtClean="0"/>
+              <a:t>OLTP</a:t>
+            </a:r>
+            <a:endParaRPr lang="en-US" dirty="0"/>
+          </a:p>
+        </p:txBody>
+      </p:sp>
+      <p:sp>
+        <p:nvSpPr>
+          <p:cNvPr id="17" name="Rectangle 16"/>
+          <p:cNvSpPr/>
+          <p:nvPr/>
+        </p:nvSpPr>
+        <p:spPr>
+          <a:xfrm>
+            <a:off x="339635" y="2336230"/>
+            <a:ext cx="914400" cy="672582"/>
+          </a:xfrm>
+          <a:prstGeom prst="rect">
+            <a:avLst/>
+          </a:prstGeom>
+        </p:spPr>
+        <p:style>
+          <a:lnRef idx="2">
+            <a:schemeClr val="accent1">
+              <a:shade val="50000"/>
+            </a:schemeClr>
+          </a:lnRef>
+          <a:fillRef idx="1">
+            <a:schemeClr val="accent1"/>
+          </a:fillRef>
+          <a:effectRef idx="0">
+            <a:schemeClr val="accent1"/>
+          </a:effectRef>
+          <a:fontRef idx="minor">
+            <a:schemeClr val="lt1"/>
+          </a:fontRef>
+        </p:style>
+        <p:txBody>
+          <a:bodyPr rtlCol="0" anchor="ctr"/>
+          <a:lstStyle/>
+          <a:p>
+            <a:pPr algn="ctr"/>
+            <a:r>
+              <a:rPr lang="en-US" dirty="0" smtClean="0"/>
+              <a:t>Off Line</a:t>
             </a:r>
             <a:endParaRPr lang="en-US" dirty="0"/>
           </a:p>
@@ -8162,7 +8928,7 @@
     </p:spTree>
     <p:extLst>
       <p:ext uri="{BB962C8B-B14F-4D97-AF65-F5344CB8AC3E}">
-        <p14:creationId xmlns:p14="http://schemas.microsoft.com/office/powerpoint/2010/main" val="3027942924"/>
+        <p14:creationId xmlns:p14="http://schemas.microsoft.com/office/powerpoint/2010/main" val="2560864101"/>
       </p:ext>
     </p:extLst>
   </p:cSld>
@@ -8201,7 +8967,7 @@
         </p:nvSpPr>
         <p:spPr>
           <a:xfrm>
-            <a:off x="112986" y="102366"/>
+            <a:off x="111512" y="-58580"/>
             <a:ext cx="10515600" cy="1325563"/>
           </a:xfrm>
         </p:spPr>
@@ -8210,42 +8976,136 @@
           <a:lstStyle/>
           <a:p>
             <a:r>
-              <a:rPr lang="en-US" dirty="0" smtClean="0"/>
-              <a:t>TOGAF</a:t>
+              <a:rPr lang="en-US" dirty="0" err="1" smtClean="0"/>
+              <a:t>Zachman</a:t>
             </a:r>
             <a:endParaRPr lang="en-US" dirty="0"/>
           </a:p>
         </p:txBody>
       </p:sp>
-      <p:sp>
-        <p:nvSpPr>
-          <p:cNvPr id="3" name="Content Placeholder 2"/>
-          <p:cNvSpPr>
-            <a:spLocks noGrp="1"/>
-          </p:cNvSpPr>
+      <p:pic>
+        <p:nvPicPr>
+          <p:cNvPr id="1026" name="Picture 2" descr="https://zachman-feac.com/images/ZI_PIcs/ZF3.jpg"/>
+          <p:cNvPicPr>
+            <a:picLocks noGrp="1" noChangeAspect="1" noChangeArrowheads="1"/>
+          </p:cNvPicPr>
           <p:nvPr>
             <p:ph idx="1"/>
           </p:nvPr>
-        </p:nvSpPr>
-        <p:spPr/>
-        <p:txBody>
-          <a:bodyPr/>
-          <a:lstStyle/>
-          <a:p>
-            <a:endParaRPr lang="en-US"/>
+        </p:nvPicPr>
+        <p:blipFill>
+          <a:blip r:embed="rId2">
+            <a:extLst>
+              <a:ext uri="{28A0092B-C50C-407E-A947-70E740481C1C}">
+                <a14:useLocalDpi xmlns:a14="http://schemas.microsoft.com/office/drawing/2010/main" val="0"/>
+              </a:ext>
+            </a:extLst>
+          </a:blip>
+          <a:srcRect/>
+          <a:stretch>
+            <a:fillRect/>
+          </a:stretch>
+        </p:blipFill>
+        <p:spPr bwMode="auto">
+          <a:xfrm>
+            <a:off x="2767361" y="604202"/>
+            <a:ext cx="7859751" cy="6073444"/>
+          </a:xfrm>
+          <a:prstGeom prst="rect">
+            <a:avLst/>
+          </a:prstGeom>
+          <a:noFill/>
+          <a:extLst>
+            <a:ext uri="{909E8E84-426E-40DD-AFC4-6F175D3DCCD1}">
+              <a14:hiddenFill xmlns:a14="http://schemas.microsoft.com/office/drawing/2010/main">
+                <a:solidFill>
+                  <a:srgbClr val="FFFFFF"/>
+                </a:solidFill>
+              </a14:hiddenFill>
+            </a:ext>
+          </a:extLst>
+        </p:spPr>
+      </p:pic>
+      <p:sp>
+        <p:nvSpPr>
+          <p:cNvPr id="4" name="TextBox 3"/>
+          <p:cNvSpPr txBox="1"/>
+          <p:nvPr/>
+        </p:nvSpPr>
+        <p:spPr>
+          <a:xfrm>
+            <a:off x="0" y="2753710"/>
+            <a:ext cx="2767361" cy="3139321"/>
+          </a:xfrm>
+          <a:prstGeom prst="rect">
+            <a:avLst/>
+          </a:prstGeom>
+          <a:noFill/>
+        </p:spPr>
+        <p:txBody>
+          <a:bodyPr wrap="square" rtlCol="0">
+            <a:spAutoFit/>
+          </a:bodyPr>
+          <a:lstStyle/>
+          <a:p>
+            <a:r>
+              <a:rPr lang="en-US" dirty="0" smtClean="0"/>
+              <a:t>Zach man only set context  but not more Architect thinking</a:t>
+            </a:r>
+          </a:p>
+          <a:p>
+            <a:endParaRPr lang="en-US" dirty="0"/>
+          </a:p>
+          <a:p>
+            <a:r>
+              <a:rPr lang="en-US" dirty="0" smtClean="0"/>
+              <a:t>Architect is responsible at each level</a:t>
+            </a:r>
+          </a:p>
+          <a:p>
+            <a:r>
+              <a:rPr lang="en-US" dirty="0" smtClean="0"/>
+              <a:t>2 major stake holder</a:t>
+            </a:r>
+          </a:p>
+          <a:p>
+            <a:r>
+              <a:rPr lang="en-US" dirty="0" smtClean="0"/>
+              <a:t>Provider &amp; Implementer</a:t>
+            </a:r>
+          </a:p>
+          <a:p>
+            <a:r>
+              <a:rPr lang="en-US" dirty="0" smtClean="0"/>
+              <a:t>2 thing more important </a:t>
+            </a:r>
+          </a:p>
+          <a:p>
+            <a:r>
+              <a:rPr lang="en-US" dirty="0" smtClean="0"/>
+              <a:t>Data (What) How (Logic) rest is optional </a:t>
+            </a:r>
+            <a:endParaRPr lang="en-US" dirty="0"/>
           </a:p>
         </p:txBody>
       </p:sp>
     </p:spTree>
     <p:extLst>
       <p:ext uri="{BB962C8B-B14F-4D97-AF65-F5344CB8AC3E}">
-        <p14:creationId xmlns:p14="http://schemas.microsoft.com/office/powerpoint/2010/main" val="1843729758"/>
+        <p14:creationId xmlns:p14="http://schemas.microsoft.com/office/powerpoint/2010/main" val="3027942924"/>
       </p:ext>
     </p:extLst>
   </p:cSld>
   <p:clrMapOvr>
     <a:masterClrMapping/>
   </p:clrMapOvr>
+  <p:timing>
+    <p:tnLst>
+      <p:par>
+        <p:cTn id="1" dur="indefinite" restart="never" nodeType="tmRoot"/>
+      </p:par>
+    </p:tnLst>
+  </p:timing>
 </p:sld>
 </file>
 
@@ -8276,29 +9136,916 @@
             <p:ph type="title"/>
           </p:nvPr>
         </p:nvSpPr>
-        <p:spPr/>
+        <p:spPr>
+          <a:xfrm>
+            <a:off x="112986" y="102366"/>
+            <a:ext cx="10515600" cy="1325563"/>
+          </a:xfrm>
+        </p:spPr>
         <p:txBody>
           <a:bodyPr/>
           <a:lstStyle/>
           <a:p>
             <a:r>
               <a:rPr lang="en-US" dirty="0" smtClean="0"/>
-              <a:t>NFR </a:t>
+              <a:t>TOGAF Pillars</a:t>
             </a:r>
             <a:endParaRPr lang="en-US" dirty="0"/>
           </a:p>
         </p:txBody>
       </p:sp>
+      <p:sp>
+        <p:nvSpPr>
+          <p:cNvPr id="5" name="Rectangle 4"/>
+          <p:cNvSpPr/>
+          <p:nvPr/>
+        </p:nvSpPr>
+        <p:spPr>
+          <a:xfrm>
+            <a:off x="459378" y="998741"/>
+            <a:ext cx="10894423" cy="631363"/>
+          </a:xfrm>
+          <a:prstGeom prst="rect">
+            <a:avLst/>
+          </a:prstGeom>
+        </p:spPr>
+        <p:style>
+          <a:lnRef idx="2">
+            <a:schemeClr val="accent1">
+              <a:shade val="50000"/>
+            </a:schemeClr>
+          </a:lnRef>
+          <a:fillRef idx="1">
+            <a:schemeClr val="accent1"/>
+          </a:fillRef>
+          <a:effectRef idx="0">
+            <a:schemeClr val="accent1"/>
+          </a:effectRef>
+          <a:fontRef idx="minor">
+            <a:schemeClr val="lt1"/>
+          </a:fontRef>
+        </p:style>
+        <p:txBody>
+          <a:bodyPr rtlCol="0" anchor="ctr"/>
+          <a:lstStyle/>
+          <a:p>
+            <a:pPr algn="ctr"/>
+            <a:r>
+              <a:rPr lang="en-US" dirty="0" smtClean="0"/>
+              <a:t>TOGAF</a:t>
+            </a:r>
+            <a:endParaRPr lang="en-US" dirty="0"/>
+          </a:p>
+        </p:txBody>
+      </p:sp>
+      <p:grpSp>
+        <p:nvGrpSpPr>
+          <p:cNvPr id="14" name="Group 13"/>
+          <p:cNvGrpSpPr/>
+          <p:nvPr/>
+        </p:nvGrpSpPr>
+        <p:grpSpPr>
+          <a:xfrm>
+            <a:off x="-46838" y="1666321"/>
+            <a:ext cx="2346105" cy="1467051"/>
+            <a:chOff x="248194" y="2259874"/>
+            <a:chExt cx="3409406" cy="3357155"/>
+          </a:xfrm>
+          <a:solidFill>
+            <a:srgbClr val="C00000"/>
+          </a:solidFill>
+        </p:grpSpPr>
+        <p:sp>
+          <p:nvSpPr>
+            <p:cNvPr id="4" name="Rectangle 3"/>
+            <p:cNvSpPr/>
+            <p:nvPr/>
+          </p:nvSpPr>
+          <p:spPr>
+            <a:xfrm>
+              <a:off x="600891" y="2259874"/>
+              <a:ext cx="2717074" cy="2899954"/>
+            </a:xfrm>
+            <a:prstGeom prst="rect">
+              <a:avLst/>
+            </a:prstGeom>
+            <a:grpFill/>
+          </p:spPr>
+          <p:style>
+            <a:lnRef idx="2">
+              <a:schemeClr val="accent1">
+                <a:shade val="50000"/>
+              </a:schemeClr>
+            </a:lnRef>
+            <a:fillRef idx="1">
+              <a:schemeClr val="accent1"/>
+            </a:fillRef>
+            <a:effectRef idx="0">
+              <a:schemeClr val="accent1"/>
+            </a:effectRef>
+            <a:fontRef idx="minor">
+              <a:schemeClr val="lt1"/>
+            </a:fontRef>
+          </p:style>
+          <p:txBody>
+            <a:bodyPr rtlCol="0" anchor="ctr"/>
+            <a:lstStyle/>
+            <a:p>
+              <a:pPr algn="ctr"/>
+              <a:r>
+                <a:rPr lang="en-US" sz="1400" b="1">
+                  <a:solidFill>
+                    <a:schemeClr val="tx1">
+                      <a:lumMod val="95000"/>
+                      <a:lumOff val="5000"/>
+                    </a:schemeClr>
+                  </a:solidFill>
+                </a:rPr>
+                <a:t>Enterprise architecture domains</a:t>
+              </a:r>
+              <a:endParaRPr lang="en-US" sz="1400">
+                <a:solidFill>
+                  <a:schemeClr val="tx1">
+                    <a:lumMod val="95000"/>
+                    <a:lumOff val="5000"/>
+                  </a:schemeClr>
+                </a:solidFill>
+              </a:endParaRPr>
+            </a:p>
+          </p:txBody>
+        </p:sp>
+        <p:cxnSp>
+          <p:nvCxnSpPr>
+            <p:cNvPr id="7" name="Straight Connector 6"/>
+            <p:cNvCxnSpPr/>
+            <p:nvPr/>
+          </p:nvCxnSpPr>
+          <p:spPr>
+            <a:xfrm flipH="1">
+              <a:off x="248195" y="5192485"/>
+              <a:ext cx="352696" cy="411481"/>
+            </a:xfrm>
+            <a:prstGeom prst="line">
+              <a:avLst/>
+            </a:prstGeom>
+            <a:grpFill/>
+          </p:spPr>
+          <p:style>
+            <a:lnRef idx="1">
+              <a:schemeClr val="accent1"/>
+            </a:lnRef>
+            <a:fillRef idx="0">
+              <a:schemeClr val="accent1"/>
+            </a:fillRef>
+            <a:effectRef idx="0">
+              <a:schemeClr val="accent1"/>
+            </a:effectRef>
+            <a:fontRef idx="minor">
+              <a:schemeClr val="tx1"/>
+            </a:fontRef>
+          </p:style>
+        </p:cxnSp>
+        <p:cxnSp>
+          <p:nvCxnSpPr>
+            <p:cNvPr id="9" name="Straight Connector 8"/>
+            <p:cNvCxnSpPr/>
+            <p:nvPr/>
+          </p:nvCxnSpPr>
+          <p:spPr>
+            <a:xfrm>
+              <a:off x="3317965" y="5159828"/>
+              <a:ext cx="339635" cy="444138"/>
+            </a:xfrm>
+            <a:prstGeom prst="line">
+              <a:avLst/>
+            </a:prstGeom>
+            <a:grpFill/>
+          </p:spPr>
+          <p:style>
+            <a:lnRef idx="1">
+              <a:schemeClr val="accent1"/>
+            </a:lnRef>
+            <a:fillRef idx="0">
+              <a:schemeClr val="accent1"/>
+            </a:fillRef>
+            <a:effectRef idx="0">
+              <a:schemeClr val="accent1"/>
+            </a:effectRef>
+            <a:fontRef idx="minor">
+              <a:schemeClr val="tx1"/>
+            </a:fontRef>
+          </p:style>
+        </p:cxnSp>
+        <p:cxnSp>
+          <p:nvCxnSpPr>
+            <p:cNvPr id="11" name="Straight Connector 10"/>
+            <p:cNvCxnSpPr/>
+            <p:nvPr/>
+          </p:nvCxnSpPr>
+          <p:spPr>
+            <a:xfrm flipV="1">
+              <a:off x="248194" y="5603966"/>
+              <a:ext cx="3409406" cy="13063"/>
+            </a:xfrm>
+            <a:prstGeom prst="line">
+              <a:avLst/>
+            </a:prstGeom>
+            <a:grpFill/>
+          </p:spPr>
+          <p:style>
+            <a:lnRef idx="1">
+              <a:schemeClr val="accent1"/>
+            </a:lnRef>
+            <a:fillRef idx="0">
+              <a:schemeClr val="accent1"/>
+            </a:fillRef>
+            <a:effectRef idx="0">
+              <a:schemeClr val="accent1"/>
+            </a:effectRef>
+            <a:fontRef idx="minor">
+              <a:schemeClr val="tx1"/>
+            </a:fontRef>
+          </p:style>
+        </p:cxnSp>
+      </p:grpSp>
+      <p:grpSp>
+        <p:nvGrpSpPr>
+          <p:cNvPr id="20" name="Group 19"/>
+          <p:cNvGrpSpPr/>
+          <p:nvPr/>
+        </p:nvGrpSpPr>
+        <p:grpSpPr>
+          <a:xfrm>
+            <a:off x="9108282" y="1685419"/>
+            <a:ext cx="2387031" cy="1463251"/>
+            <a:chOff x="248194" y="2259874"/>
+            <a:chExt cx="3409406" cy="3357155"/>
+          </a:xfrm>
+          <a:solidFill>
+            <a:srgbClr val="C00000"/>
+          </a:solidFill>
+        </p:grpSpPr>
+        <p:sp>
+          <p:nvSpPr>
+            <p:cNvPr id="21" name="Rectangle 20"/>
+            <p:cNvSpPr/>
+            <p:nvPr/>
+          </p:nvSpPr>
+          <p:spPr>
+            <a:xfrm>
+              <a:off x="600891" y="2259874"/>
+              <a:ext cx="2717074" cy="2899954"/>
+            </a:xfrm>
+            <a:prstGeom prst="rect">
+              <a:avLst/>
+            </a:prstGeom>
+            <a:grpFill/>
+          </p:spPr>
+          <p:style>
+            <a:lnRef idx="2">
+              <a:schemeClr val="accent1">
+                <a:shade val="50000"/>
+              </a:schemeClr>
+            </a:lnRef>
+            <a:fillRef idx="1">
+              <a:schemeClr val="accent1"/>
+            </a:fillRef>
+            <a:effectRef idx="0">
+              <a:schemeClr val="accent1"/>
+            </a:effectRef>
+            <a:fontRef idx="minor">
+              <a:schemeClr val="lt1"/>
+            </a:fontRef>
+          </p:style>
+          <p:txBody>
+            <a:bodyPr rtlCol="0" anchor="ctr"/>
+            <a:lstStyle/>
+            <a:p>
+              <a:pPr algn="ctr"/>
+              <a:r>
+                <a:rPr lang="en-US" sz="1400" b="1" dirty="0">
+                  <a:solidFill>
+                    <a:schemeClr val="tx1">
+                      <a:lumMod val="95000"/>
+                      <a:lumOff val="5000"/>
+                    </a:schemeClr>
+                  </a:solidFill>
+                </a:rPr>
+                <a:t>Enterprise Continuum</a:t>
+              </a:r>
+              <a:endParaRPr lang="en-US" sz="1400" dirty="0">
+                <a:solidFill>
+                  <a:schemeClr val="tx1">
+                    <a:lumMod val="95000"/>
+                    <a:lumOff val="5000"/>
+                  </a:schemeClr>
+                </a:solidFill>
+              </a:endParaRPr>
+            </a:p>
+          </p:txBody>
+        </p:sp>
+        <p:cxnSp>
+          <p:nvCxnSpPr>
+            <p:cNvPr id="22" name="Straight Connector 21"/>
+            <p:cNvCxnSpPr/>
+            <p:nvPr/>
+          </p:nvCxnSpPr>
+          <p:spPr>
+            <a:xfrm flipH="1">
+              <a:off x="248195" y="5192485"/>
+              <a:ext cx="352696" cy="411481"/>
+            </a:xfrm>
+            <a:prstGeom prst="line">
+              <a:avLst/>
+            </a:prstGeom>
+            <a:grpFill/>
+          </p:spPr>
+          <p:style>
+            <a:lnRef idx="1">
+              <a:schemeClr val="accent1"/>
+            </a:lnRef>
+            <a:fillRef idx="0">
+              <a:schemeClr val="accent1"/>
+            </a:fillRef>
+            <a:effectRef idx="0">
+              <a:schemeClr val="accent1"/>
+            </a:effectRef>
+            <a:fontRef idx="minor">
+              <a:schemeClr val="tx1"/>
+            </a:fontRef>
+          </p:style>
+        </p:cxnSp>
+        <p:cxnSp>
+          <p:nvCxnSpPr>
+            <p:cNvPr id="23" name="Straight Connector 22"/>
+            <p:cNvCxnSpPr/>
+            <p:nvPr/>
+          </p:nvCxnSpPr>
+          <p:spPr>
+            <a:xfrm>
+              <a:off x="3317965" y="5159828"/>
+              <a:ext cx="339635" cy="444138"/>
+            </a:xfrm>
+            <a:prstGeom prst="line">
+              <a:avLst/>
+            </a:prstGeom>
+            <a:grpFill/>
+          </p:spPr>
+          <p:style>
+            <a:lnRef idx="1">
+              <a:schemeClr val="accent1"/>
+            </a:lnRef>
+            <a:fillRef idx="0">
+              <a:schemeClr val="accent1"/>
+            </a:fillRef>
+            <a:effectRef idx="0">
+              <a:schemeClr val="accent1"/>
+            </a:effectRef>
+            <a:fontRef idx="minor">
+              <a:schemeClr val="tx1"/>
+            </a:fontRef>
+          </p:style>
+        </p:cxnSp>
+        <p:cxnSp>
+          <p:nvCxnSpPr>
+            <p:cNvPr id="24" name="Straight Connector 23"/>
+            <p:cNvCxnSpPr/>
+            <p:nvPr/>
+          </p:nvCxnSpPr>
+          <p:spPr>
+            <a:xfrm flipV="1">
+              <a:off x="248194" y="5603966"/>
+              <a:ext cx="3409406" cy="13063"/>
+            </a:xfrm>
+            <a:prstGeom prst="line">
+              <a:avLst/>
+            </a:prstGeom>
+            <a:grpFill/>
+          </p:spPr>
+          <p:style>
+            <a:lnRef idx="1">
+              <a:schemeClr val="accent1"/>
+            </a:lnRef>
+            <a:fillRef idx="0">
+              <a:schemeClr val="accent1"/>
+            </a:fillRef>
+            <a:effectRef idx="0">
+              <a:schemeClr val="accent1"/>
+            </a:effectRef>
+            <a:fontRef idx="minor">
+              <a:schemeClr val="tx1"/>
+            </a:fontRef>
+          </p:style>
+        </p:cxnSp>
+      </p:grpSp>
+      <p:grpSp>
+        <p:nvGrpSpPr>
+          <p:cNvPr id="30" name="Group 29"/>
+          <p:cNvGrpSpPr/>
+          <p:nvPr/>
+        </p:nvGrpSpPr>
+        <p:grpSpPr>
+          <a:xfrm>
+            <a:off x="112986" y="3387173"/>
+            <a:ext cx="2064970" cy="2177439"/>
+            <a:chOff x="965612" y="4595012"/>
+            <a:chExt cx="2064970" cy="2177439"/>
+          </a:xfrm>
+        </p:grpSpPr>
+        <p:sp>
+          <p:nvSpPr>
+            <p:cNvPr id="25" name="Pentagon 24"/>
+            <p:cNvSpPr/>
+            <p:nvPr/>
+          </p:nvSpPr>
+          <p:spPr>
+            <a:xfrm>
+              <a:off x="965612" y="4595012"/>
+              <a:ext cx="2037806" cy="484632"/>
+            </a:xfrm>
+            <a:prstGeom prst="homePlate">
+              <a:avLst/>
+            </a:prstGeom>
+            <a:solidFill>
+              <a:schemeClr val="accent5">
+                <a:lumMod val="20000"/>
+                <a:lumOff val="80000"/>
+              </a:schemeClr>
+            </a:solidFill>
+          </p:spPr>
+          <p:style>
+            <a:lnRef idx="2">
+              <a:schemeClr val="accent1">
+                <a:shade val="50000"/>
+              </a:schemeClr>
+            </a:lnRef>
+            <a:fillRef idx="1">
+              <a:schemeClr val="accent1"/>
+            </a:fillRef>
+            <a:effectRef idx="0">
+              <a:schemeClr val="accent1"/>
+            </a:effectRef>
+            <a:fontRef idx="minor">
+              <a:schemeClr val="lt1"/>
+            </a:fontRef>
+          </p:style>
+          <p:txBody>
+            <a:bodyPr rtlCol="0" anchor="ctr"/>
+            <a:lstStyle/>
+            <a:p>
+              <a:pPr algn="ctr"/>
+              <a:r>
+                <a:rPr lang="en-US" sz="1200">
+                  <a:solidFill>
+                    <a:schemeClr val="tx1">
+                      <a:lumMod val="95000"/>
+                      <a:lumOff val="5000"/>
+                    </a:schemeClr>
+                  </a:solidFill>
+                </a:rPr>
+                <a:t>Business architecture</a:t>
+              </a:r>
+            </a:p>
+          </p:txBody>
+        </p:sp>
+        <p:sp>
+          <p:nvSpPr>
+            <p:cNvPr id="26" name="Pentagon 25"/>
+            <p:cNvSpPr/>
+            <p:nvPr/>
+          </p:nvSpPr>
+          <p:spPr>
+            <a:xfrm>
+              <a:off x="992776" y="5146339"/>
+              <a:ext cx="2037806" cy="484632"/>
+            </a:xfrm>
+            <a:prstGeom prst="homePlate">
+              <a:avLst/>
+            </a:prstGeom>
+            <a:solidFill>
+              <a:schemeClr val="accent5">
+                <a:lumMod val="20000"/>
+                <a:lumOff val="80000"/>
+              </a:schemeClr>
+            </a:solidFill>
+          </p:spPr>
+          <p:style>
+            <a:lnRef idx="2">
+              <a:schemeClr val="accent1">
+                <a:shade val="50000"/>
+              </a:schemeClr>
+            </a:lnRef>
+            <a:fillRef idx="1">
+              <a:schemeClr val="accent1"/>
+            </a:fillRef>
+            <a:effectRef idx="0">
+              <a:schemeClr val="accent1"/>
+            </a:effectRef>
+            <a:fontRef idx="minor">
+              <a:schemeClr val="lt1"/>
+            </a:fontRef>
+          </p:style>
+          <p:txBody>
+            <a:bodyPr rtlCol="0" anchor="ctr"/>
+            <a:lstStyle/>
+            <a:p>
+              <a:pPr algn="ctr"/>
+              <a:r>
+                <a:rPr lang="en-US" sz="1200">
+                  <a:solidFill>
+                    <a:schemeClr val="tx1">
+                      <a:lumMod val="95000"/>
+                      <a:lumOff val="5000"/>
+                    </a:schemeClr>
+                  </a:solidFill>
+                </a:rPr>
+                <a:t>Data architecture </a:t>
+              </a:r>
+            </a:p>
+          </p:txBody>
+        </p:sp>
+        <p:sp>
+          <p:nvSpPr>
+            <p:cNvPr id="27" name="Pentagon 26"/>
+            <p:cNvSpPr/>
+            <p:nvPr/>
+          </p:nvSpPr>
+          <p:spPr>
+            <a:xfrm>
+              <a:off x="992776" y="5717079"/>
+              <a:ext cx="2037806" cy="484632"/>
+            </a:xfrm>
+            <a:prstGeom prst="homePlate">
+              <a:avLst/>
+            </a:prstGeom>
+            <a:solidFill>
+              <a:schemeClr val="accent5">
+                <a:lumMod val="20000"/>
+                <a:lumOff val="80000"/>
+              </a:schemeClr>
+            </a:solidFill>
+          </p:spPr>
+          <p:style>
+            <a:lnRef idx="2">
+              <a:schemeClr val="accent1">
+                <a:shade val="50000"/>
+              </a:schemeClr>
+            </a:lnRef>
+            <a:fillRef idx="1">
+              <a:schemeClr val="accent1"/>
+            </a:fillRef>
+            <a:effectRef idx="0">
+              <a:schemeClr val="accent1"/>
+            </a:effectRef>
+            <a:fontRef idx="minor">
+              <a:schemeClr val="lt1"/>
+            </a:fontRef>
+          </p:style>
+          <p:txBody>
+            <a:bodyPr rtlCol="0" anchor="ctr"/>
+            <a:lstStyle/>
+            <a:p>
+              <a:pPr algn="ctr"/>
+              <a:r>
+                <a:rPr lang="en-US" sz="1200">
+                  <a:solidFill>
+                    <a:schemeClr val="tx1">
+                      <a:lumMod val="95000"/>
+                      <a:lumOff val="5000"/>
+                    </a:schemeClr>
+                  </a:solidFill>
+                </a:rPr>
+                <a:t>Applications architecture </a:t>
+              </a:r>
+            </a:p>
+          </p:txBody>
+        </p:sp>
+        <p:sp>
+          <p:nvSpPr>
+            <p:cNvPr id="28" name="Pentagon 27"/>
+            <p:cNvSpPr/>
+            <p:nvPr/>
+          </p:nvSpPr>
+          <p:spPr>
+            <a:xfrm>
+              <a:off x="992776" y="6287819"/>
+              <a:ext cx="2037806" cy="484632"/>
+            </a:xfrm>
+            <a:prstGeom prst="homePlate">
+              <a:avLst/>
+            </a:prstGeom>
+            <a:solidFill>
+              <a:schemeClr val="accent5">
+                <a:lumMod val="20000"/>
+                <a:lumOff val="80000"/>
+              </a:schemeClr>
+            </a:solidFill>
+          </p:spPr>
+          <p:style>
+            <a:lnRef idx="2">
+              <a:schemeClr val="accent1">
+                <a:shade val="50000"/>
+              </a:schemeClr>
+            </a:lnRef>
+            <a:fillRef idx="1">
+              <a:schemeClr val="accent1"/>
+            </a:fillRef>
+            <a:effectRef idx="0">
+              <a:schemeClr val="accent1"/>
+            </a:effectRef>
+            <a:fontRef idx="minor">
+              <a:schemeClr val="lt1"/>
+            </a:fontRef>
+          </p:style>
+          <p:txBody>
+            <a:bodyPr rtlCol="0" anchor="ctr"/>
+            <a:lstStyle/>
+            <a:p>
+              <a:pPr algn="ctr"/>
+              <a:r>
+                <a:rPr lang="en-US" sz="1200">
+                  <a:solidFill>
+                    <a:schemeClr val="tx1">
+                      <a:lumMod val="95000"/>
+                      <a:lumOff val="5000"/>
+                    </a:schemeClr>
+                  </a:solidFill>
+                </a:rPr>
+                <a:t>Technical architecture</a:t>
+              </a:r>
+            </a:p>
+          </p:txBody>
+        </p:sp>
+      </p:grpSp>
+      <p:pic>
+        <p:nvPicPr>
+          <p:cNvPr id="1026" name="Picture 2" descr="https://pubs.opengroup.org/architecture/togaf8-doc/arch/Figures/adm.gif"/>
+          <p:cNvPicPr>
+            <a:picLocks noChangeAspect="1" noChangeArrowheads="1"/>
+          </p:cNvPicPr>
+          <p:nvPr/>
+        </p:nvPicPr>
+        <p:blipFill>
+          <a:blip r:embed="rId2">
+            <a:extLst>
+              <a:ext uri="{28A0092B-C50C-407E-A947-70E740481C1C}">
+                <a14:useLocalDpi xmlns:a14="http://schemas.microsoft.com/office/drawing/2010/main" val="0"/>
+              </a:ext>
+            </a:extLst>
+          </a:blip>
+          <a:srcRect/>
+          <a:stretch>
+            <a:fillRect/>
+          </a:stretch>
+        </p:blipFill>
+        <p:spPr bwMode="auto">
+          <a:xfrm>
+            <a:off x="2177956" y="2733774"/>
+            <a:ext cx="4672805" cy="4124226"/>
+          </a:xfrm>
+          <a:prstGeom prst="rect">
+            <a:avLst/>
+          </a:prstGeom>
+          <a:noFill/>
+          <a:extLst>
+            <a:ext uri="{909E8E84-426E-40DD-AFC4-6F175D3DCCD1}">
+              <a14:hiddenFill xmlns:a14="http://schemas.microsoft.com/office/drawing/2010/main">
+                <a:solidFill>
+                  <a:srgbClr val="FFFFFF"/>
+                </a:solidFill>
+              </a14:hiddenFill>
+            </a:ext>
+          </a:extLst>
+        </p:spPr>
+      </p:pic>
+      <p:grpSp>
+        <p:nvGrpSpPr>
+          <p:cNvPr id="15" name="Group 14"/>
+          <p:cNvGrpSpPr/>
+          <p:nvPr/>
+        </p:nvGrpSpPr>
+        <p:grpSpPr>
+          <a:xfrm>
+            <a:off x="3408853" y="1669654"/>
+            <a:ext cx="2576821" cy="1459450"/>
+            <a:chOff x="248194" y="2259874"/>
+            <a:chExt cx="3409406" cy="3357155"/>
+          </a:xfrm>
+          <a:solidFill>
+            <a:srgbClr val="C00000"/>
+          </a:solidFill>
+        </p:grpSpPr>
+        <p:sp>
+          <p:nvSpPr>
+            <p:cNvPr id="16" name="Rectangle 15"/>
+            <p:cNvSpPr/>
+            <p:nvPr/>
+          </p:nvSpPr>
+          <p:spPr>
+            <a:xfrm>
+              <a:off x="600891" y="2259874"/>
+              <a:ext cx="2717074" cy="2899954"/>
+            </a:xfrm>
+            <a:prstGeom prst="rect">
+              <a:avLst/>
+            </a:prstGeom>
+            <a:grpFill/>
+          </p:spPr>
+          <p:style>
+            <a:lnRef idx="2">
+              <a:schemeClr val="accent1">
+                <a:shade val="50000"/>
+              </a:schemeClr>
+            </a:lnRef>
+            <a:fillRef idx="1">
+              <a:schemeClr val="accent1"/>
+            </a:fillRef>
+            <a:effectRef idx="0">
+              <a:schemeClr val="accent1"/>
+            </a:effectRef>
+            <a:fontRef idx="minor">
+              <a:schemeClr val="lt1"/>
+            </a:fontRef>
+          </p:style>
+          <p:txBody>
+            <a:bodyPr rtlCol="0" anchor="ctr"/>
+            <a:lstStyle/>
+            <a:p>
+              <a:pPr algn="ctr"/>
+              <a:r>
+                <a:rPr lang="en-US" sz="1400" b="1" dirty="0">
+                  <a:solidFill>
+                    <a:schemeClr val="tx1">
+                      <a:lumMod val="95000"/>
+                      <a:lumOff val="5000"/>
+                    </a:schemeClr>
+                  </a:solidFill>
+                </a:rPr>
+                <a:t>Architecture Development Method</a:t>
+              </a:r>
+              <a:endParaRPr lang="en-US" sz="1400" dirty="0">
+                <a:solidFill>
+                  <a:schemeClr val="tx1">
+                    <a:lumMod val="95000"/>
+                    <a:lumOff val="5000"/>
+                  </a:schemeClr>
+                </a:solidFill>
+              </a:endParaRPr>
+            </a:p>
+          </p:txBody>
+        </p:sp>
+        <p:cxnSp>
+          <p:nvCxnSpPr>
+            <p:cNvPr id="17" name="Straight Connector 16"/>
+            <p:cNvCxnSpPr/>
+            <p:nvPr/>
+          </p:nvCxnSpPr>
+          <p:spPr>
+            <a:xfrm flipH="1">
+              <a:off x="248195" y="5192485"/>
+              <a:ext cx="352696" cy="411481"/>
+            </a:xfrm>
+            <a:prstGeom prst="line">
+              <a:avLst/>
+            </a:prstGeom>
+            <a:grpFill/>
+          </p:spPr>
+          <p:style>
+            <a:lnRef idx="1">
+              <a:schemeClr val="accent1"/>
+            </a:lnRef>
+            <a:fillRef idx="0">
+              <a:schemeClr val="accent1"/>
+            </a:fillRef>
+            <a:effectRef idx="0">
+              <a:schemeClr val="accent1"/>
+            </a:effectRef>
+            <a:fontRef idx="minor">
+              <a:schemeClr val="tx1"/>
+            </a:fontRef>
+          </p:style>
+        </p:cxnSp>
+        <p:cxnSp>
+          <p:nvCxnSpPr>
+            <p:cNvPr id="18" name="Straight Connector 17"/>
+            <p:cNvCxnSpPr/>
+            <p:nvPr/>
+          </p:nvCxnSpPr>
+          <p:spPr>
+            <a:xfrm>
+              <a:off x="3317965" y="5159828"/>
+              <a:ext cx="339635" cy="444138"/>
+            </a:xfrm>
+            <a:prstGeom prst="line">
+              <a:avLst/>
+            </a:prstGeom>
+            <a:grpFill/>
+          </p:spPr>
+          <p:style>
+            <a:lnRef idx="1">
+              <a:schemeClr val="accent1"/>
+            </a:lnRef>
+            <a:fillRef idx="0">
+              <a:schemeClr val="accent1"/>
+            </a:fillRef>
+            <a:effectRef idx="0">
+              <a:schemeClr val="accent1"/>
+            </a:effectRef>
+            <a:fontRef idx="minor">
+              <a:schemeClr val="tx1"/>
+            </a:fontRef>
+          </p:style>
+        </p:cxnSp>
+        <p:cxnSp>
+          <p:nvCxnSpPr>
+            <p:cNvPr id="19" name="Straight Connector 18"/>
+            <p:cNvCxnSpPr/>
+            <p:nvPr/>
+          </p:nvCxnSpPr>
+          <p:spPr>
+            <a:xfrm flipV="1">
+              <a:off x="248194" y="5603966"/>
+              <a:ext cx="3409406" cy="13063"/>
+            </a:xfrm>
+            <a:prstGeom prst="line">
+              <a:avLst/>
+            </a:prstGeom>
+            <a:grpFill/>
+          </p:spPr>
+          <p:style>
+            <a:lnRef idx="1">
+              <a:schemeClr val="accent1"/>
+            </a:lnRef>
+            <a:fillRef idx="0">
+              <a:schemeClr val="accent1"/>
+            </a:fillRef>
+            <a:effectRef idx="0">
+              <a:schemeClr val="accent1"/>
+            </a:effectRef>
+            <a:fontRef idx="minor">
+              <a:schemeClr val="tx1"/>
+            </a:fontRef>
+          </p:style>
+        </p:cxnSp>
+      </p:grpSp>
+      <p:pic>
+        <p:nvPicPr>
+          <p:cNvPr id="1028" name="Picture 4" descr="https://pubs.opengroup.org/architecture/togaf91-doc/arch/Figures/39_entcon_oview.png"/>
+          <p:cNvPicPr>
+            <a:picLocks noChangeAspect="1" noChangeArrowheads="1"/>
+          </p:cNvPicPr>
+          <p:nvPr/>
+        </p:nvPicPr>
+        <p:blipFill>
+          <a:blip r:embed="rId3">
+            <a:extLst>
+              <a:ext uri="{28A0092B-C50C-407E-A947-70E740481C1C}">
+                <a14:useLocalDpi xmlns:a14="http://schemas.microsoft.com/office/drawing/2010/main" val="0"/>
+              </a:ext>
+            </a:extLst>
+          </a:blip>
+          <a:srcRect/>
+          <a:stretch>
+            <a:fillRect/>
+          </a:stretch>
+        </p:blipFill>
+        <p:spPr bwMode="auto">
+          <a:xfrm>
+            <a:off x="7040880" y="3004709"/>
+            <a:ext cx="5057868" cy="3539782"/>
+          </a:xfrm>
+          <a:prstGeom prst="rect">
+            <a:avLst/>
+          </a:prstGeom>
+          <a:noFill/>
+          <a:extLst>
+            <a:ext uri="{909E8E84-426E-40DD-AFC4-6F175D3DCCD1}">
+              <a14:hiddenFill xmlns:a14="http://schemas.microsoft.com/office/drawing/2010/main">
+                <a:solidFill>
+                  <a:srgbClr val="FFFFFF"/>
+                </a:solidFill>
+              </a14:hiddenFill>
+            </a:ext>
+          </a:extLst>
+        </p:spPr>
+      </p:pic>
     </p:spTree>
     <p:extLst>
       <p:ext uri="{BB962C8B-B14F-4D97-AF65-F5344CB8AC3E}">
-        <p14:creationId xmlns:p14="http://schemas.microsoft.com/office/powerpoint/2010/main" val="2286662558"/>
+        <p14:creationId xmlns:p14="http://schemas.microsoft.com/office/powerpoint/2010/main" val="1843729758"/>
       </p:ext>
     </p:extLst>
   </p:cSld>
   <p:clrMapOvr>
     <a:masterClrMapping/>
   </p:clrMapOvr>
+  <p:timing>
+    <p:tnLst>
+      <p:par>
+        <p:cTn id="1" dur="indefinite" restart="never" nodeType="tmRoot"/>
+      </p:par>
+    </p:tnLst>
+  </p:timing>
 </p:sld>
 </file>
 
@@ -8336,6 +10083,66 @@
           <a:p>
             <a:r>
               <a:rPr lang="en-US" dirty="0" smtClean="0"/>
+              <a:t>NFR </a:t>
+            </a:r>
+            <a:endParaRPr lang="en-US" dirty="0"/>
+          </a:p>
+        </p:txBody>
+      </p:sp>
+    </p:spTree>
+    <p:extLst>
+      <p:ext uri="{BB962C8B-B14F-4D97-AF65-F5344CB8AC3E}">
+        <p14:creationId xmlns:p14="http://schemas.microsoft.com/office/powerpoint/2010/main" val="2286662558"/>
+      </p:ext>
+    </p:extLst>
+  </p:cSld>
+  <p:clrMapOvr>
+    <a:masterClrMapping/>
+  </p:clrMapOvr>
+  <p:timing>
+    <p:tnLst>
+      <p:par>
+        <p:cTn id="1" dur="indefinite" restart="never" nodeType="tmRoot"/>
+      </p:par>
+    </p:tnLst>
+  </p:timing>
+</p:sld>
+</file>
+
+<file path=ppt/slides/slide8.xml><?xml version="1.0" encoding="utf-8"?>
+<p:sld xmlns:a="http://schemas.openxmlformats.org/drawingml/2006/main" xmlns:r="http://schemas.openxmlformats.org/officeDocument/2006/relationships" xmlns:p="http://schemas.openxmlformats.org/presentationml/2006/main">
+  <p:cSld>
+    <p:spTree>
+      <p:nvGrpSpPr>
+        <p:cNvPr id="1" name=""/>
+        <p:cNvGrpSpPr/>
+        <p:nvPr/>
+      </p:nvGrpSpPr>
+      <p:grpSpPr>
+        <a:xfrm>
+          <a:off x="0" y="0"/>
+          <a:ext cx="0" cy="0"/>
+          <a:chOff x="0" y="0"/>
+          <a:chExt cx="0" cy="0"/>
+        </a:xfrm>
+      </p:grpSpPr>
+      <p:sp>
+        <p:nvSpPr>
+          <p:cNvPr id="2" name="Title 1"/>
+          <p:cNvSpPr>
+            <a:spLocks noGrp="1"/>
+          </p:cNvSpPr>
+          <p:nvPr>
+            <p:ph type="title"/>
+          </p:nvPr>
+        </p:nvSpPr>
+        <p:spPr/>
+        <p:txBody>
+          <a:bodyPr/>
+          <a:lstStyle/>
+          <a:p>
+            <a:r>
+              <a:rPr lang="en-US" dirty="0" smtClean="0"/>
               <a:t>Architecture Deliverables </a:t>
             </a:r>
             <a:endParaRPr lang="en-US" dirty="0"/>
@@ -8850,7 +10657,7 @@
 </p:sld>
 </file>
 
-<file path=ppt/slides/slide8.xml><?xml version="1.0" encoding="utf-8"?>
+<file path=ppt/slides/slide9.xml><?xml version="1.0" encoding="utf-8"?>
 <p:sld xmlns:a="http://schemas.openxmlformats.org/drawingml/2006/main" xmlns:r="http://schemas.openxmlformats.org/officeDocument/2006/relationships" xmlns:p="http://schemas.openxmlformats.org/presentationml/2006/main">
   <p:cSld>
     <p:spTree>

</xml_diff>